<commit_message>
pre ppt & spec
</commit_message>
<xml_diff>
--- a/boom overview.pptx
+++ b/boom overview.pptx
@@ -5,10 +5,10 @@
     <p:sldMasterId id="2147483649" r:id="rId1"/>
   </p:sldMasterIdLst>
   <p:notesMasterIdLst>
-    <p:notesMasterId r:id="rId30"/>
+    <p:notesMasterId r:id="rId31"/>
   </p:notesMasterIdLst>
   <p:handoutMasterIdLst>
-    <p:handoutMasterId r:id="rId31"/>
+    <p:handoutMasterId r:id="rId32"/>
   </p:handoutMasterIdLst>
   <p:sldIdLst>
     <p:sldId id="256" r:id="rId2"/>
@@ -29,16 +29,17 @@
     <p:sldId id="821" r:id="rId17"/>
     <p:sldId id="826" r:id="rId18"/>
     <p:sldId id="827" r:id="rId19"/>
-    <p:sldId id="828" r:id="rId20"/>
-    <p:sldId id="829" r:id="rId21"/>
-    <p:sldId id="830" r:id="rId22"/>
-    <p:sldId id="833" r:id="rId23"/>
-    <p:sldId id="831" r:id="rId24"/>
-    <p:sldId id="834" r:id="rId25"/>
-    <p:sldId id="832" r:id="rId26"/>
-    <p:sldId id="824" r:id="rId27"/>
-    <p:sldId id="825" r:id="rId28"/>
-    <p:sldId id="715" r:id="rId29"/>
+    <p:sldId id="835" r:id="rId20"/>
+    <p:sldId id="828" r:id="rId21"/>
+    <p:sldId id="829" r:id="rId22"/>
+    <p:sldId id="830" r:id="rId23"/>
+    <p:sldId id="833" r:id="rId24"/>
+    <p:sldId id="831" r:id="rId25"/>
+    <p:sldId id="834" r:id="rId26"/>
+    <p:sldId id="832" r:id="rId27"/>
+    <p:sldId id="824" r:id="rId28"/>
+    <p:sldId id="825" r:id="rId29"/>
+    <p:sldId id="715" r:id="rId30"/>
   </p:sldIdLst>
   <p:sldSz cx="9144000" cy="6858000" type="screen4x3"/>
   <p:notesSz cx="6858000" cy="9144000"/>
@@ -2528,7 +2529,98 @@
           <a:bodyPr/>
           <a:lstStyle/>
           <a:p>
-            <a:endParaRPr lang="zh-CN" altLang="en-US" dirty="0"/>
+            <a:r>
+              <a:rPr lang="en-US" altLang="zh-CN" dirty="0" smtClean="0"/>
+              <a:t>Issue</a:t>
+            </a:r>
+            <a:r>
+              <a:rPr lang="en-US" altLang="zh-CN" baseline="0" dirty="0" smtClean="0"/>
+              <a:t> window</a:t>
+            </a:r>
+            <a:r>
+              <a:rPr lang="zh-CN" altLang="en-US" baseline="0" dirty="0" smtClean="0"/>
+              <a:t>中保存还没有执行的微指令，微指令的操作数准备好，并且没有因为转移预测错误被取消时，会把</a:t>
+            </a:r>
+            <a:r>
+              <a:rPr lang="en-US" altLang="zh-CN" baseline="0" dirty="0" smtClean="0"/>
+              <a:t>request</a:t>
+            </a:r>
+            <a:r>
+              <a:rPr lang="zh-CN" altLang="en-US" baseline="0" dirty="0" smtClean="0"/>
+              <a:t>信号置为高，选择逻辑会在</a:t>
+            </a:r>
+            <a:r>
+              <a:rPr lang="en-US" altLang="zh-CN" baseline="0" dirty="0" smtClean="0"/>
+              <a:t>request</a:t>
+            </a:r>
+            <a:r>
+              <a:rPr lang="zh-CN" altLang="en-US" baseline="0" dirty="0" smtClean="0"/>
+              <a:t>信号有效的指令中选择进行发射</a:t>
+            </a:r>
+            <a:endParaRPr lang="en-US" altLang="zh-CN" baseline="0" dirty="0" smtClean="0"/>
+          </a:p>
+          <a:p>
+            <a:r>
+              <a:rPr lang="zh-CN" altLang="en-US" baseline="0" dirty="0" smtClean="0"/>
+              <a:t>所有类型的指令共用一个发射窗口</a:t>
+            </a:r>
+            <a:r>
+              <a:rPr lang="en-US" altLang="zh-CN" baseline="0" dirty="0" smtClean="0"/>
+              <a:t/>
+            </a:r>
+            <a:br>
+              <a:rPr lang="en-US" altLang="zh-CN" baseline="0" dirty="0" smtClean="0"/>
+            </a:br>
+            <a:r>
+              <a:rPr lang="zh-CN" altLang="en-US" baseline="0" dirty="0" smtClean="0"/>
+              <a:t>发射逻辑有多个端口，每个端口处理一类微指令，选择逻辑实际上是一系列固定的优先级</a:t>
+            </a:r>
+            <a:endParaRPr lang="en-US" altLang="zh-CN" baseline="0" dirty="0" smtClean="0"/>
+          </a:p>
+          <a:p>
+            <a:r>
+              <a:rPr lang="zh-CN" altLang="en-US" baseline="0" dirty="0" smtClean="0"/>
+              <a:t>功能单元无法使用时发射逻辑会取消掉</a:t>
+            </a:r>
+            <a:r>
+              <a:rPr lang="en-US" altLang="zh-CN" baseline="0" dirty="0" smtClean="0"/>
+              <a:t>request</a:t>
+            </a:r>
+            <a:r>
+              <a:rPr lang="zh-CN" altLang="en-US" baseline="0" dirty="0" smtClean="0"/>
+              <a:t>信号，等待</a:t>
+            </a:r>
+            <a:r>
+              <a:rPr lang="en-US" altLang="zh-CN" baseline="0" dirty="0" smtClean="0"/>
+              <a:t>wake-up</a:t>
+            </a:r>
+            <a:r>
+              <a:rPr lang="zh-CN" altLang="en-US" baseline="0" dirty="0" smtClean="0"/>
+              <a:t>重新开始发射指令</a:t>
+            </a:r>
+            <a:endParaRPr lang="en-US" altLang="zh-CN" baseline="0" dirty="0" smtClean="0"/>
+          </a:p>
+          <a:p>
+            <a:r>
+              <a:rPr lang="en-US" altLang="zh-CN" baseline="0" dirty="0" smtClean="0"/>
+              <a:t>wake-up</a:t>
+            </a:r>
+            <a:r>
+              <a:rPr lang="zh-CN" altLang="en-US" baseline="0" dirty="0" smtClean="0"/>
+              <a:t>分为两种，</a:t>
+            </a:r>
+            <a:r>
+              <a:rPr lang="en-US" altLang="zh-CN" baseline="0" dirty="0" smtClean="0"/>
+              <a:t>fast wake-up</a:t>
+            </a:r>
+            <a:r>
+              <a:rPr lang="zh-CN" altLang="en-US" baseline="0" dirty="0" smtClean="0"/>
+              <a:t>和</a:t>
+            </a:r>
+            <a:r>
+              <a:rPr lang="en-US" altLang="zh-CN" baseline="0" dirty="0" smtClean="0"/>
+              <a:t>slow wake-up</a:t>
+            </a:r>
           </a:p>
         </p:txBody>
       </p:sp>
@@ -2555,7 +2647,7 @@
               <a:pPr>
                 <a:defRPr/>
               </a:pPr>
-              <a:t>18</a:t>
+              <a:t>17</a:t>
             </a:fld>
             <a:endParaRPr lang="en-US" altLang="zh-CN"/>
           </a:p>
@@ -2564,7 +2656,7 @@
     </p:spTree>
     <p:extLst>
       <p:ext uri="{BB962C8B-B14F-4D97-AF65-F5344CB8AC3E}">
-        <p14:creationId xmlns:p14="http://schemas.microsoft.com/office/powerpoint/2010/main" val="2970442713"/>
+        <p14:creationId xmlns:p14="http://schemas.microsoft.com/office/powerpoint/2010/main" val="1370931827"/>
       </p:ext>
     </p:extLst>
   </p:cSld>
@@ -2618,6 +2710,22 @@
           <a:bodyPr/>
           <a:lstStyle/>
           <a:p>
+            <a:r>
+              <a:rPr lang="en-US" altLang="zh-CN" dirty="0" smtClean="0"/>
+              <a:t>Unordered</a:t>
+            </a:r>
+            <a:r>
+              <a:rPr lang="zh-CN" altLang="en-US" dirty="0" smtClean="0"/>
+              <a:t>：无法预测的分支指令会放在低优先级的位置上，直到</a:t>
+            </a:r>
+            <a:r>
+              <a:rPr lang="en-US" altLang="zh-CN" dirty="0" smtClean="0"/>
+              <a:t>ROB</a:t>
+            </a:r>
+            <a:r>
+              <a:rPr lang="zh-CN" altLang="en-US" dirty="0" smtClean="0"/>
+              <a:t>被填满，发射窗口开始收缩前，这个分支指令不会被发射</a:t>
+            </a:r>
             <a:endParaRPr lang="zh-CN" altLang="en-US" dirty="0"/>
           </a:p>
         </p:txBody>
@@ -2645,7 +2753,7 @@
               <a:pPr>
                 <a:defRPr/>
               </a:pPr>
-              <a:t>20</a:t>
+              <a:t>18</a:t>
             </a:fld>
             <a:endParaRPr lang="en-US" altLang="zh-CN"/>
           </a:p>
@@ -2654,7 +2762,7 @@
     </p:spTree>
     <p:extLst>
       <p:ext uri="{BB962C8B-B14F-4D97-AF65-F5344CB8AC3E}">
-        <p14:creationId xmlns:p14="http://schemas.microsoft.com/office/powerpoint/2010/main" val="3581643686"/>
+        <p14:creationId xmlns:p14="http://schemas.microsoft.com/office/powerpoint/2010/main" val="4153438707"/>
       </p:ext>
     </p:extLst>
   </p:cSld>
@@ -2735,7 +2843,7 @@
               <a:pPr>
                 <a:defRPr/>
               </a:pPr>
-              <a:t>22</a:t>
+              <a:t>19</a:t>
             </a:fld>
             <a:endParaRPr lang="en-US" altLang="zh-CN"/>
           </a:p>
@@ -2744,7 +2852,7 @@
     </p:spTree>
     <p:extLst>
       <p:ext uri="{BB962C8B-B14F-4D97-AF65-F5344CB8AC3E}">
-        <p14:creationId xmlns:p14="http://schemas.microsoft.com/office/powerpoint/2010/main" val="2166323481"/>
+        <p14:creationId xmlns:p14="http://schemas.microsoft.com/office/powerpoint/2010/main" val="2970442713"/>
       </p:ext>
     </p:extLst>
   </p:cSld>
@@ -2798,6 +2906,53 @@
           <a:bodyPr/>
           <a:lstStyle/>
           <a:p>
+            <a:r>
+              <a:rPr lang="en-US" altLang="zh-CN" dirty="0" smtClean="0"/>
+              <a:t>BOOM</a:t>
+            </a:r>
+            <a:r>
+              <a:rPr lang="zh-CN" altLang="en-US" dirty="0" smtClean="0"/>
+              <a:t>使用了</a:t>
+            </a:r>
+            <a:r>
+              <a:rPr lang="en-US" altLang="zh-CN" dirty="0" smtClean="0"/>
+              <a:t>Berkeley </a:t>
+            </a:r>
+            <a:r>
+              <a:rPr lang="en-US" altLang="zh-CN" dirty="0" err="1" smtClean="0"/>
+              <a:t>hardfloat</a:t>
+            </a:r>
+            <a:r>
+              <a:rPr lang="en-US" altLang="zh-CN" baseline="0" dirty="0" smtClean="0"/>
+              <a:t> floating point units</a:t>
+            </a:r>
+            <a:r>
+              <a:rPr lang="zh-CN" altLang="en-US" baseline="0" dirty="0" smtClean="0"/>
+              <a:t>，硬件浮点单元内部使用</a:t>
+            </a:r>
+            <a:r>
+              <a:rPr lang="en-US" altLang="zh-CN" baseline="0" dirty="0" smtClean="0"/>
+              <a:t>65</a:t>
+            </a:r>
+            <a:r>
+              <a:rPr lang="zh-CN" altLang="en-US" baseline="0" dirty="0" smtClean="0"/>
+              <a:t>位操作数，因此所有的寄存器都是</a:t>
+            </a:r>
+            <a:r>
+              <a:rPr lang="en-US" altLang="zh-CN" baseline="0" dirty="0" smtClean="0"/>
+              <a:t>65</a:t>
+            </a:r>
+            <a:r>
+              <a:rPr lang="zh-CN" altLang="en-US" baseline="0" dirty="0" smtClean="0"/>
+              <a:t>位</a:t>
+            </a:r>
+            <a:endParaRPr lang="en-US" altLang="zh-CN" baseline="0" dirty="0" smtClean="0"/>
+          </a:p>
+          <a:p>
+            <a:r>
+              <a:rPr lang="zh-CN" altLang="en-US" baseline="0" dirty="0" smtClean="0"/>
+              <a:t>假设</a:t>
+            </a:r>
             <a:endParaRPr lang="zh-CN" altLang="en-US" dirty="0"/>
           </a:p>
         </p:txBody>
@@ -2825,7 +2980,7 @@
               <a:pPr>
                 <a:defRPr/>
               </a:pPr>
-              <a:t>24</a:t>
+              <a:t>20</a:t>
             </a:fld>
             <a:endParaRPr lang="en-US" altLang="zh-CN"/>
           </a:p>
@@ -2834,7 +2989,97 @@
     </p:spTree>
     <p:extLst>
       <p:ext uri="{BB962C8B-B14F-4D97-AF65-F5344CB8AC3E}">
-        <p14:creationId xmlns:p14="http://schemas.microsoft.com/office/powerpoint/2010/main" val="2038081551"/>
+        <p14:creationId xmlns:p14="http://schemas.microsoft.com/office/powerpoint/2010/main" val="2500312059"/>
+      </p:ext>
+    </p:extLst>
+  </p:cSld>
+  <p:clrMapOvr>
+    <a:masterClrMapping/>
+  </p:clrMapOvr>
+</p:notes>
+</file>
+
+<file path=ppt/notesSlides/notesSlide19.xml><?xml version="1.0" encoding="utf-8"?>
+<p:notes xmlns:a="http://schemas.openxmlformats.org/drawingml/2006/main" xmlns:r="http://schemas.openxmlformats.org/officeDocument/2006/relationships" xmlns:p="http://schemas.openxmlformats.org/presentationml/2006/main">
+  <p:cSld>
+    <p:spTree>
+      <p:nvGrpSpPr>
+        <p:cNvPr id="1" name=""/>
+        <p:cNvGrpSpPr/>
+        <p:nvPr/>
+      </p:nvGrpSpPr>
+      <p:grpSpPr>
+        <a:xfrm>
+          <a:off x="0" y="0"/>
+          <a:ext cx="0" cy="0"/>
+          <a:chOff x="0" y="0"/>
+          <a:chExt cx="0" cy="0"/>
+        </a:xfrm>
+      </p:grpSpPr>
+      <p:sp>
+        <p:nvSpPr>
+          <p:cNvPr id="2" name="幻灯片图像占位符 1"/>
+          <p:cNvSpPr>
+            <a:spLocks noGrp="1" noRot="1" noChangeAspect="1"/>
+          </p:cNvSpPr>
+          <p:nvPr>
+            <p:ph type="sldImg"/>
+          </p:nvPr>
+        </p:nvSpPr>
+        <p:spPr/>
+      </p:sp>
+      <p:sp>
+        <p:nvSpPr>
+          <p:cNvPr id="3" name="备注占位符 2"/>
+          <p:cNvSpPr>
+            <a:spLocks noGrp="1"/>
+          </p:cNvSpPr>
+          <p:nvPr>
+            <p:ph type="body" idx="1"/>
+          </p:nvPr>
+        </p:nvSpPr>
+        <p:spPr/>
+        <p:txBody>
+          <a:bodyPr/>
+          <a:lstStyle/>
+          <a:p>
+            <a:endParaRPr lang="zh-CN" altLang="en-US" dirty="0"/>
+          </a:p>
+        </p:txBody>
+      </p:sp>
+      <p:sp>
+        <p:nvSpPr>
+          <p:cNvPr id="4" name="灯片编号占位符 3"/>
+          <p:cNvSpPr>
+            <a:spLocks noGrp="1"/>
+          </p:cNvSpPr>
+          <p:nvPr>
+            <p:ph type="sldNum" sz="quarter" idx="10"/>
+          </p:nvPr>
+        </p:nvSpPr>
+        <p:spPr/>
+        <p:txBody>
+          <a:bodyPr/>
+          <a:lstStyle/>
+          <a:p>
+            <a:pPr>
+              <a:defRPr/>
+            </a:pPr>
+            <a:fld id="{A1323B56-F179-4CBA-B162-C86E75DEA6B5}" type="slidenum">
+              <a:rPr lang="en-US" altLang="zh-CN" smtClean="0"/>
+              <a:pPr>
+                <a:defRPr/>
+              </a:pPr>
+              <a:t>21</a:t>
+            </a:fld>
+            <a:endParaRPr lang="en-US" altLang="zh-CN"/>
+          </a:p>
+        </p:txBody>
+      </p:sp>
+    </p:spTree>
+    <p:extLst>
+      <p:ext uri="{BB962C8B-B14F-4D97-AF65-F5344CB8AC3E}">
+        <p14:creationId xmlns:p14="http://schemas.microsoft.com/office/powerpoint/2010/main" val="3581643686"/>
       </p:ext>
     </p:extLst>
   </p:cSld>
@@ -2925,6 +3170,186 @@
     <p:extLst>
       <p:ext uri="{BB962C8B-B14F-4D97-AF65-F5344CB8AC3E}">
         <p14:creationId xmlns:p14="http://schemas.microsoft.com/office/powerpoint/2010/main" val="232098597"/>
+      </p:ext>
+    </p:extLst>
+  </p:cSld>
+  <p:clrMapOvr>
+    <a:masterClrMapping/>
+  </p:clrMapOvr>
+</p:notes>
+</file>
+
+<file path=ppt/notesSlides/notesSlide20.xml><?xml version="1.0" encoding="utf-8"?>
+<p:notes xmlns:a="http://schemas.openxmlformats.org/drawingml/2006/main" xmlns:r="http://schemas.openxmlformats.org/officeDocument/2006/relationships" xmlns:p="http://schemas.openxmlformats.org/presentationml/2006/main">
+  <p:cSld>
+    <p:spTree>
+      <p:nvGrpSpPr>
+        <p:cNvPr id="1" name=""/>
+        <p:cNvGrpSpPr/>
+        <p:nvPr/>
+      </p:nvGrpSpPr>
+      <p:grpSpPr>
+        <a:xfrm>
+          <a:off x="0" y="0"/>
+          <a:ext cx="0" cy="0"/>
+          <a:chOff x="0" y="0"/>
+          <a:chExt cx="0" cy="0"/>
+        </a:xfrm>
+      </p:grpSpPr>
+      <p:sp>
+        <p:nvSpPr>
+          <p:cNvPr id="2" name="幻灯片图像占位符 1"/>
+          <p:cNvSpPr>
+            <a:spLocks noGrp="1" noRot="1" noChangeAspect="1"/>
+          </p:cNvSpPr>
+          <p:nvPr>
+            <p:ph type="sldImg"/>
+          </p:nvPr>
+        </p:nvSpPr>
+        <p:spPr/>
+      </p:sp>
+      <p:sp>
+        <p:nvSpPr>
+          <p:cNvPr id="3" name="备注占位符 2"/>
+          <p:cNvSpPr>
+            <a:spLocks noGrp="1"/>
+          </p:cNvSpPr>
+          <p:nvPr>
+            <p:ph type="body" idx="1"/>
+          </p:nvPr>
+        </p:nvSpPr>
+        <p:spPr/>
+        <p:txBody>
+          <a:bodyPr/>
+          <a:lstStyle/>
+          <a:p>
+            <a:endParaRPr lang="zh-CN" altLang="en-US" dirty="0"/>
+          </a:p>
+        </p:txBody>
+      </p:sp>
+      <p:sp>
+        <p:nvSpPr>
+          <p:cNvPr id="4" name="灯片编号占位符 3"/>
+          <p:cNvSpPr>
+            <a:spLocks noGrp="1"/>
+          </p:cNvSpPr>
+          <p:nvPr>
+            <p:ph type="sldNum" sz="quarter" idx="10"/>
+          </p:nvPr>
+        </p:nvSpPr>
+        <p:spPr/>
+        <p:txBody>
+          <a:bodyPr/>
+          <a:lstStyle/>
+          <a:p>
+            <a:pPr>
+              <a:defRPr/>
+            </a:pPr>
+            <a:fld id="{A1323B56-F179-4CBA-B162-C86E75DEA6B5}" type="slidenum">
+              <a:rPr lang="en-US" altLang="zh-CN" smtClean="0"/>
+              <a:pPr>
+                <a:defRPr/>
+              </a:pPr>
+              <a:t>23</a:t>
+            </a:fld>
+            <a:endParaRPr lang="en-US" altLang="zh-CN"/>
+          </a:p>
+        </p:txBody>
+      </p:sp>
+    </p:spTree>
+    <p:extLst>
+      <p:ext uri="{BB962C8B-B14F-4D97-AF65-F5344CB8AC3E}">
+        <p14:creationId xmlns:p14="http://schemas.microsoft.com/office/powerpoint/2010/main" val="2166323481"/>
+      </p:ext>
+    </p:extLst>
+  </p:cSld>
+  <p:clrMapOvr>
+    <a:masterClrMapping/>
+  </p:clrMapOvr>
+</p:notes>
+</file>
+
+<file path=ppt/notesSlides/notesSlide21.xml><?xml version="1.0" encoding="utf-8"?>
+<p:notes xmlns:a="http://schemas.openxmlformats.org/drawingml/2006/main" xmlns:r="http://schemas.openxmlformats.org/officeDocument/2006/relationships" xmlns:p="http://schemas.openxmlformats.org/presentationml/2006/main">
+  <p:cSld>
+    <p:spTree>
+      <p:nvGrpSpPr>
+        <p:cNvPr id="1" name=""/>
+        <p:cNvGrpSpPr/>
+        <p:nvPr/>
+      </p:nvGrpSpPr>
+      <p:grpSpPr>
+        <a:xfrm>
+          <a:off x="0" y="0"/>
+          <a:ext cx="0" cy="0"/>
+          <a:chOff x="0" y="0"/>
+          <a:chExt cx="0" cy="0"/>
+        </a:xfrm>
+      </p:grpSpPr>
+      <p:sp>
+        <p:nvSpPr>
+          <p:cNvPr id="2" name="幻灯片图像占位符 1"/>
+          <p:cNvSpPr>
+            <a:spLocks noGrp="1" noRot="1" noChangeAspect="1"/>
+          </p:cNvSpPr>
+          <p:nvPr>
+            <p:ph type="sldImg"/>
+          </p:nvPr>
+        </p:nvSpPr>
+        <p:spPr/>
+      </p:sp>
+      <p:sp>
+        <p:nvSpPr>
+          <p:cNvPr id="3" name="备注占位符 2"/>
+          <p:cNvSpPr>
+            <a:spLocks noGrp="1"/>
+          </p:cNvSpPr>
+          <p:nvPr>
+            <p:ph type="body" idx="1"/>
+          </p:nvPr>
+        </p:nvSpPr>
+        <p:spPr/>
+        <p:txBody>
+          <a:bodyPr/>
+          <a:lstStyle/>
+          <a:p>
+            <a:endParaRPr lang="zh-CN" altLang="en-US" dirty="0"/>
+          </a:p>
+        </p:txBody>
+      </p:sp>
+      <p:sp>
+        <p:nvSpPr>
+          <p:cNvPr id="4" name="灯片编号占位符 3"/>
+          <p:cNvSpPr>
+            <a:spLocks noGrp="1"/>
+          </p:cNvSpPr>
+          <p:nvPr>
+            <p:ph type="sldNum" sz="quarter" idx="10"/>
+          </p:nvPr>
+        </p:nvSpPr>
+        <p:spPr/>
+        <p:txBody>
+          <a:bodyPr/>
+          <a:lstStyle/>
+          <a:p>
+            <a:pPr>
+              <a:defRPr/>
+            </a:pPr>
+            <a:fld id="{A1323B56-F179-4CBA-B162-C86E75DEA6B5}" type="slidenum">
+              <a:rPr lang="en-US" altLang="zh-CN" smtClean="0"/>
+              <a:pPr>
+                <a:defRPr/>
+              </a:pPr>
+              <a:t>25</a:t>
+            </a:fld>
+            <a:endParaRPr lang="en-US" altLang="zh-CN"/>
+          </a:p>
+        </p:txBody>
+      </p:sp>
+    </p:spTree>
+    <p:extLst>
+      <p:ext uri="{BB962C8B-B14F-4D97-AF65-F5344CB8AC3E}">
+        <p14:creationId xmlns:p14="http://schemas.microsoft.com/office/powerpoint/2010/main" val="2038081551"/>
       </p:ext>
     </p:extLst>
   </p:cSld>
@@ -8875,7 +9300,6 @@
               <a:rPr lang="en-US" altLang="zh-CN" sz="2400" dirty="0" smtClean="0"/>
               <a:t>ROB &amp; The Dispatch Stage </a:t>
             </a:r>
-            <a:endParaRPr lang="en-US" altLang="zh-CN" sz="2400" dirty="0" smtClean="0"/>
           </a:p>
           <a:p>
             <a:r>
@@ -8968,7 +9392,11 @@
           <a:p>
             <a:r>
               <a:rPr lang="en-US" altLang="zh-CN" dirty="0" smtClean="0"/>
-              <a:t>The Issue Slot</a:t>
+              <a:t>The Issue </a:t>
+            </a:r>
+            <a:r>
+              <a:rPr lang="en-US" altLang="zh-CN" dirty="0" smtClean="0"/>
+              <a:t>Unit</a:t>
             </a:r>
             <a:endParaRPr lang="zh-CN" altLang="en-US" dirty="0"/>
           </a:p>
@@ -8990,16 +9418,18 @@
           <a:lstStyle/>
           <a:p>
             <a:r>
-              <a:rPr lang="zh-CN" altLang="en-US" sz="2400" dirty="0" smtClean="0">
-                <a:latin typeface="Calibri (正文)"/>
-              </a:rPr>
-              <a:t>简单介绍</a:t>
-            </a:r>
-            <a:r>
               <a:rPr lang="en-US" altLang="zh-CN" sz="2400" dirty="0" smtClean="0">
                 <a:latin typeface="Calibri (正文)"/>
               </a:rPr>
-              <a:t>~~~</a:t>
+              <a:t>Issue window</a:t>
+            </a:r>
+          </a:p>
+          <a:p>
+            <a:r>
+              <a:rPr lang="en-US" altLang="zh-CN" sz="2400" dirty="0" smtClean="0">
+                <a:latin typeface="Calibri (正文)"/>
+              </a:rPr>
+              <a:t>Issue slot</a:t>
             </a:r>
             <a:endParaRPr lang="zh-CN" altLang="en-US" sz="2400" dirty="0">
               <a:latin typeface="Calibri (正文)"/>
@@ -9016,7 +9446,7 @@
           <p:nvPr/>
         </p:nvPicPr>
         <p:blipFill>
-          <a:blip r:embed="rId2"/>
+          <a:blip r:embed="rId3"/>
           <a:stretch>
             <a:fillRect/>
           </a:stretch>
@@ -9084,123 +9514,215 @@
           <a:lstStyle/>
           <a:p>
             <a:r>
-              <a:rPr lang="zh-CN" altLang="en-US" dirty="0" smtClean="0"/>
-              <a:t>主要内容</a:t>
+              <a:rPr lang="en-US" altLang="zh-CN" dirty="0" smtClean="0"/>
+              <a:t>The Issue Unit</a:t>
             </a:r>
             <a:endParaRPr lang="zh-CN" altLang="en-US" dirty="0"/>
           </a:p>
         </p:txBody>
       </p:sp>
-      <p:sp>
-        <p:nvSpPr>
-          <p:cNvPr id="3" name="内容占位符 2"/>
-          <p:cNvSpPr>
-            <a:spLocks noGrp="1"/>
-          </p:cNvSpPr>
-          <p:nvPr>
-            <p:ph idx="1"/>
-          </p:nvPr>
-        </p:nvSpPr>
-        <p:spPr/>
+      <mc:AlternateContent xmlns:mc="http://schemas.openxmlformats.org/markup-compatibility/2006">
+        <mc:Choice xmlns:a14="http://schemas.microsoft.com/office/drawing/2010/main" Requires="a14">
+          <p:sp>
+            <p:nvSpPr>
+              <p:cNvPr id="3" name="内容占位符 2"/>
+              <p:cNvSpPr>
+                <a:spLocks noGrp="1"/>
+              </p:cNvSpPr>
+              <p:nvPr>
+                <p:ph idx="1"/>
+              </p:nvPr>
+            </p:nvSpPr>
+            <p:spPr/>
+            <p:txBody>
+              <a:bodyPr/>
+              <a:lstStyle/>
+              <a:p>
+                <a:r>
+                  <a:rPr lang="en-US" altLang="zh-CN" dirty="0" smtClean="0"/>
+                  <a:t>Issue Logic</a:t>
+                </a:r>
+              </a:p>
+              <a:p>
+                <a:pPr lvl="1"/>
+                <a:r>
+                  <a:rPr lang="en-US" altLang="zh-CN" dirty="0" smtClean="0"/>
+                  <a:t>Un-ordered</a:t>
+                </a:r>
+              </a:p>
+              <a:p>
+                <a:pPr lvl="2"/>
+                <a:r>
+                  <a:rPr lang="zh-CN" altLang="en-US" dirty="0" smtClean="0"/>
+                  <a:t>逻辑与</a:t>
+                </a:r>
+                <a:r>
+                  <a:rPr lang="en-US" altLang="zh-CN" dirty="0" smtClean="0"/>
+                  <a:t>MIP R10K</a:t>
+                </a:r>
+                <a:r>
+                  <a:rPr lang="zh-CN" altLang="en-US" dirty="0" smtClean="0"/>
+                  <a:t>的发射逻辑类似</a:t>
+                </a:r>
+                <a14:m>
+                  <m:oMath xmlns:m="http://schemas.openxmlformats.org/officeDocument/2006/math">
+                    <m:r>
+                      <a:rPr lang="en-US" altLang="zh-CN" i="1" dirty="0" smtClean="0">
+                        <a:latin typeface="Cambria Math" panose="02040503050406030204" pitchFamily="18" charset="0"/>
+                      </a:rPr>
+                      <m:t>[1]</m:t>
+                    </m:r>
+                  </m:oMath>
+                </a14:m>
+                <a:endParaRPr lang="en-US" altLang="zh-CN" dirty="0" smtClean="0">
+                  <a:latin typeface="宋体" panose="02010600030101010101" pitchFamily="2" charset="-122"/>
+                  <a:ea typeface="宋体" panose="02010600030101010101" pitchFamily="2" charset="-122"/>
+                </a:endParaRPr>
+              </a:p>
+              <a:p>
+                <a:pPr lvl="2"/>
+                <a:r>
+                  <a:rPr lang="zh-CN" altLang="en-US" dirty="0" smtClean="0"/>
+                  <a:t>特定情境下性能可能非常差</a:t>
+                </a:r>
+                <a:endParaRPr lang="en-US" altLang="zh-CN" dirty="0" smtClean="0"/>
+              </a:p>
+              <a:p>
+                <a:pPr lvl="1"/>
+                <a:r>
+                  <a:rPr lang="en-US" altLang="zh-CN" dirty="0" smtClean="0"/>
+                  <a:t>Age-ordered</a:t>
+                </a:r>
+              </a:p>
+              <a:p>
+                <a:pPr lvl="2"/>
+                <a:r>
+                  <a:rPr lang="zh-CN" altLang="en-US" dirty="0" smtClean="0"/>
+                  <a:t>发射窗口中的指令会随时间提高优先级</a:t>
+                </a:r>
+                <a:endParaRPr lang="en-US" altLang="zh-CN" dirty="0" smtClean="0"/>
+              </a:p>
+              <a:p>
+                <a:pPr lvl="2"/>
+                <a:r>
+                  <a:rPr lang="zh-CN" altLang="en-US" dirty="0"/>
+                  <a:t>能效</a:t>
+                </a:r>
+                <a:r>
+                  <a:rPr lang="zh-CN" altLang="en-US" dirty="0" smtClean="0"/>
+                  <a:t>性较差</a:t>
+                </a:r>
+                <a:endParaRPr lang="zh-CN" altLang="en-US" dirty="0"/>
+              </a:p>
+            </p:txBody>
+          </p:sp>
+        </mc:Choice>
+        <mc:Fallback>
+          <p:sp>
+            <p:nvSpPr>
+              <p:cNvPr id="3" name="内容占位符 2"/>
+              <p:cNvSpPr>
+                <a:spLocks noGrp="1" noRot="1" noChangeAspect="1" noMove="1" noResize="1" noEditPoints="1" noAdjustHandles="1" noChangeArrowheads="1" noChangeShapeType="1" noTextEdit="1"/>
+              </p:cNvSpPr>
+              <p:nvPr>
+                <p:ph idx="1"/>
+              </p:nvPr>
+            </p:nvSpPr>
+            <p:spPr>
+              <a:blipFill rotWithShape="0">
+                <a:blip r:embed="rId3"/>
+                <a:stretch>
+                  <a:fillRect l="-1673" t="-1487"/>
+                </a:stretch>
+              </a:blipFill>
+            </p:spPr>
+            <p:txBody>
+              <a:bodyPr/>
+              <a:lstStyle/>
+              <a:p>
+                <a:r>
+                  <a:rPr lang="zh-CN" altLang="en-US">
+                    <a:noFill/>
+                  </a:rPr>
+                  <a:t> </a:t>
+                </a:r>
+              </a:p>
+            </p:txBody>
+          </p:sp>
+        </mc:Fallback>
+      </mc:AlternateContent>
+      <p:sp>
+        <p:nvSpPr>
+          <p:cNvPr id="4" name="文本框 3"/>
+          <p:cNvSpPr txBox="1"/>
+          <p:nvPr/>
+        </p:nvSpPr>
+        <p:spPr>
+          <a:xfrm>
+            <a:off x="395536" y="6093296"/>
+            <a:ext cx="8352928" cy="307777"/>
+          </a:xfrm>
+          <a:prstGeom prst="rect">
+            <a:avLst/>
+          </a:prstGeom>
+          <a:noFill/>
+        </p:spPr>
         <p:txBody>
-          <a:bodyPr/>
+          <a:bodyPr wrap="square" rtlCol="0">
+            <a:spAutoFit/>
+          </a:bodyPr>
           <a:lstStyle/>
           <a:p>
             <a:r>
-              <a:rPr lang="en-US" altLang="zh-CN" sz="2400" dirty="0" smtClean="0"/>
-              <a:t>Introduction &amp; Overview</a:t>
-            </a:r>
-          </a:p>
-          <a:p>
-            <a:r>
-              <a:rPr lang="en-US" altLang="zh-CN" sz="2400" dirty="0" smtClean="0"/>
-              <a:t>Instruction Fetch</a:t>
-            </a:r>
-            <a:endParaRPr lang="zh-CN" altLang="en-US" sz="2400" dirty="0"/>
-          </a:p>
-          <a:p>
-            <a:r>
-              <a:rPr lang="en-US" altLang="zh-CN" sz="2400" dirty="0"/>
-              <a:t>Unified Physical Register </a:t>
-            </a:r>
-            <a:r>
-              <a:rPr lang="en-US" altLang="zh-CN" sz="2400" dirty="0" smtClean="0"/>
-              <a:t>File</a:t>
-            </a:r>
-          </a:p>
-          <a:p>
-            <a:r>
-              <a:rPr lang="en-US" altLang="zh-CN" sz="2400" dirty="0" smtClean="0"/>
-              <a:t>The Decode Stage</a:t>
-            </a:r>
-          </a:p>
-          <a:p>
-            <a:r>
-              <a:rPr lang="en-US" altLang="zh-CN" sz="2400" dirty="0" smtClean="0"/>
-              <a:t>The Rename Stage</a:t>
-            </a:r>
-          </a:p>
-          <a:p>
-            <a:r>
-              <a:rPr lang="en-US" altLang="zh-CN" sz="2400" dirty="0" smtClean="0"/>
-              <a:t>ROB &amp; The Dispatch Stage </a:t>
-            </a:r>
-            <a:endParaRPr lang="en-US" altLang="zh-CN" sz="2400" dirty="0" smtClean="0"/>
-          </a:p>
-          <a:p>
-            <a:r>
-              <a:rPr lang="en-US" altLang="zh-CN" sz="2400" dirty="0"/>
-              <a:t>The Issue Unit</a:t>
-            </a:r>
-          </a:p>
-          <a:p>
-            <a:r>
-              <a:rPr lang="en-US" altLang="zh-CN" sz="2400" dirty="0">
+              <a:rPr lang="en-US" altLang="zh-CN" sz="1400" b="0" dirty="0" smtClean="0">
                 <a:solidFill>
-                  <a:srgbClr val="FF0000"/>
+                  <a:schemeClr val="tx1"/>
                 </a:solidFill>
               </a:rPr>
-              <a:t>The Register File and Bypass</a:t>
-            </a:r>
-          </a:p>
-          <a:p>
-            <a:r>
-              <a:rPr lang="en-US" altLang="zh-CN" sz="2400" dirty="0"/>
-              <a:t>The Execute Pipeline</a:t>
-            </a:r>
-          </a:p>
-          <a:p>
-            <a:r>
-              <a:rPr lang="en-US" altLang="zh-CN" sz="2400" dirty="0"/>
-              <a:t>The Load/Store Unit</a:t>
-            </a:r>
-          </a:p>
-          <a:p>
-            <a:r>
-              <a:rPr lang="zh-CN" altLang="en-US" sz="2400" dirty="0"/>
-              <a:t>后期工作安排</a:t>
-            </a:r>
-            <a:endParaRPr lang="en-US" altLang="zh-CN" sz="2400" dirty="0"/>
+              <a:t>[1] K</a:t>
+            </a:r>
+            <a:r>
+              <a:rPr lang="en-US" altLang="zh-CN" sz="1400" b="0" dirty="0">
+                <a:solidFill>
+                  <a:schemeClr val="tx1"/>
+                </a:solidFill>
+              </a:rPr>
+              <a:t>. Yeager. The MIPS R10000 Superscalar Microprocessor. IEEE Micro, 16(2):</a:t>
+            </a:r>
+            <a:r>
+              <a:rPr lang="en-US" altLang="zh-CN" sz="1400" b="0" dirty="0" smtClean="0">
+                <a:solidFill>
+                  <a:schemeClr val="tx1"/>
+                </a:solidFill>
+              </a:rPr>
+              <a:t>28-41</a:t>
+            </a:r>
+            <a:r>
+              <a:rPr lang="en-US" altLang="zh-CN" sz="1400" b="0" dirty="0">
+                <a:solidFill>
+                  <a:schemeClr val="tx1"/>
+                </a:solidFill>
+              </a:rPr>
+              <a:t>, 1996.</a:t>
+            </a:r>
+            <a:endParaRPr lang="zh-CN" altLang="en-US" sz="1400" dirty="0">
+              <a:solidFill>
+                <a:schemeClr val="tx1"/>
+              </a:solidFill>
+            </a:endParaRPr>
           </a:p>
         </p:txBody>
       </p:sp>
     </p:spTree>
     <p:extLst>
       <p:ext uri="{BB962C8B-B14F-4D97-AF65-F5344CB8AC3E}">
-        <p14:creationId xmlns:p14="http://schemas.microsoft.com/office/powerpoint/2010/main" val="180239790"/>
+        <p14:creationId xmlns:p14="http://schemas.microsoft.com/office/powerpoint/2010/main" val="4117977839"/>
       </p:ext>
     </p:extLst>
   </p:cSld>
   <p:clrMapOvr>
     <a:masterClrMapping/>
   </p:clrMapOvr>
-  <p:timing>
-    <p:tnLst>
-      <p:par>
-        <p:cTn id="1" dur="indefinite" restart="never" nodeType="tmRoot"/>
-      </p:par>
-    </p:tnLst>
-  </p:timing>
 </p:sld>
 </file>
 
@@ -9389,12 +9911,8 @@
           <a:lstStyle/>
           <a:p>
             <a:r>
-              <a:rPr lang="en-US" altLang="zh-CN" dirty="0"/>
-              <a:t>The Register File and </a:t>
-            </a:r>
-            <a:r>
-              <a:rPr lang="en-US" altLang="zh-CN" dirty="0" smtClean="0"/>
-              <a:t>Bypass</a:t>
+              <a:rPr lang="zh-CN" altLang="en-US" dirty="0" smtClean="0"/>
+              <a:t>主要内容</a:t>
             </a:r>
             <a:endParaRPr lang="zh-CN" altLang="en-US" dirty="0"/>
           </a:p>
@@ -9416,51 +9934,86 @@
           <a:lstStyle/>
           <a:p>
             <a:r>
-              <a:rPr lang="zh-CN" altLang="en-US" sz="2400" dirty="0" smtClean="0">
-                <a:latin typeface="Calibri (正文)"/>
-              </a:rPr>
-              <a:t>简单介绍</a:t>
-            </a:r>
-            <a:r>
-              <a:rPr lang="en-US" altLang="zh-CN" sz="2400" dirty="0" smtClean="0">
-                <a:latin typeface="Calibri (正文)"/>
-              </a:rPr>
-              <a:t>~~~</a:t>
-            </a:r>
-            <a:endParaRPr lang="zh-CN" altLang="en-US" sz="2400" dirty="0">
-              <a:latin typeface="Calibri (正文)"/>
-            </a:endParaRPr>
+              <a:rPr lang="en-US" altLang="zh-CN" sz="2400" dirty="0" smtClean="0"/>
+              <a:t>Introduction &amp; Overview</a:t>
+            </a:r>
+          </a:p>
+          <a:p>
+            <a:r>
+              <a:rPr lang="en-US" altLang="zh-CN" sz="2400" dirty="0" smtClean="0"/>
+              <a:t>Instruction Fetch</a:t>
+            </a:r>
+            <a:endParaRPr lang="zh-CN" altLang="en-US" sz="2400" dirty="0"/>
+          </a:p>
+          <a:p>
+            <a:r>
+              <a:rPr lang="en-US" altLang="zh-CN" sz="2400" dirty="0"/>
+              <a:t>Unified Physical Register </a:t>
+            </a:r>
+            <a:r>
+              <a:rPr lang="en-US" altLang="zh-CN" sz="2400" dirty="0" smtClean="0"/>
+              <a:t>File</a:t>
+            </a:r>
+          </a:p>
+          <a:p>
+            <a:r>
+              <a:rPr lang="en-US" altLang="zh-CN" sz="2400" dirty="0" smtClean="0"/>
+              <a:t>The Decode Stage</a:t>
+            </a:r>
+          </a:p>
+          <a:p>
+            <a:r>
+              <a:rPr lang="en-US" altLang="zh-CN" sz="2400" dirty="0" smtClean="0"/>
+              <a:t>The Rename Stage</a:t>
+            </a:r>
+          </a:p>
+          <a:p>
+            <a:r>
+              <a:rPr lang="en-US" altLang="zh-CN" sz="2400" dirty="0" smtClean="0"/>
+              <a:t>ROB &amp; The Dispatch Stage </a:t>
+            </a:r>
+          </a:p>
+          <a:p>
+            <a:r>
+              <a:rPr lang="en-US" altLang="zh-CN" sz="2400" dirty="0"/>
+              <a:t>The Issue Unit</a:t>
+            </a:r>
+          </a:p>
+          <a:p>
+            <a:r>
+              <a:rPr lang="en-US" altLang="zh-CN" sz="2400" dirty="0">
+                <a:solidFill>
+                  <a:srgbClr val="FF0000"/>
+                </a:solidFill>
+              </a:rPr>
+              <a:t>The Register File and Bypass</a:t>
+            </a:r>
+          </a:p>
+          <a:p>
+            <a:r>
+              <a:rPr lang="en-US" altLang="zh-CN" sz="2400" dirty="0"/>
+              <a:t>The Execute Pipeline</a:t>
+            </a:r>
+          </a:p>
+          <a:p>
+            <a:r>
+              <a:rPr lang="en-US" altLang="zh-CN" sz="2400" dirty="0"/>
+              <a:t>The Load/Store Unit</a:t>
+            </a:r>
+          </a:p>
+          <a:p>
+            <a:r>
+              <a:rPr lang="zh-CN" altLang="en-US" sz="2400" dirty="0"/>
+              <a:t>后期工作安排</a:t>
+            </a:r>
+            <a:endParaRPr lang="en-US" altLang="zh-CN" sz="2400" dirty="0"/>
           </a:p>
         </p:txBody>
       </p:sp>
-      <p:pic>
-        <p:nvPicPr>
-          <p:cNvPr id="4" name="图片 3"/>
-          <p:cNvPicPr>
-            <a:picLocks noChangeAspect="1"/>
-          </p:cNvPicPr>
-          <p:nvPr/>
-        </p:nvPicPr>
-        <p:blipFill>
-          <a:blip r:embed="rId2"/>
-          <a:stretch>
-            <a:fillRect/>
-          </a:stretch>
-        </p:blipFill>
-        <p:spPr>
-          <a:xfrm>
-            <a:off x="1133475" y="2276872"/>
-            <a:ext cx="6877050" cy="3486150"/>
-          </a:xfrm>
-          <a:prstGeom prst="rect">
-            <a:avLst/>
-          </a:prstGeom>
-        </p:spPr>
-      </p:pic>
     </p:spTree>
     <p:extLst>
       <p:ext uri="{BB962C8B-B14F-4D97-AF65-F5344CB8AC3E}">
-        <p14:creationId xmlns:p14="http://schemas.microsoft.com/office/powerpoint/2010/main" val="2099892906"/>
+        <p14:creationId xmlns:p14="http://schemas.microsoft.com/office/powerpoint/2010/main" val="180239790"/>
       </p:ext>
     </p:extLst>
   </p:cSld>
@@ -9510,8 +10063,12 @@
           <a:lstStyle/>
           <a:p>
             <a:r>
-              <a:rPr lang="zh-CN" altLang="en-US" dirty="0" smtClean="0"/>
-              <a:t>主要内容</a:t>
+              <a:rPr lang="en-US" altLang="zh-CN" dirty="0"/>
+              <a:t>The Register File and </a:t>
+            </a:r>
+            <a:r>
+              <a:rPr lang="en-US" altLang="zh-CN" dirty="0" smtClean="0"/>
+              <a:t>Bypass</a:t>
             </a:r>
             <a:endParaRPr lang="zh-CN" altLang="en-US" dirty="0"/>
           </a:p>
@@ -9533,92 +10090,816 @@
           <a:lstStyle/>
           <a:p>
             <a:r>
-              <a:rPr lang="en-US" altLang="zh-CN" sz="2400" dirty="0" smtClean="0"/>
-              <a:t>Introduction &amp; Overview</a:t>
-            </a:r>
-          </a:p>
-          <a:p>
-            <a:r>
-              <a:rPr lang="en-US" altLang="zh-CN" sz="2400" dirty="0" smtClean="0"/>
-              <a:t>Instruction Fetch</a:t>
-            </a:r>
-            <a:endParaRPr lang="zh-CN" altLang="en-US" sz="2400" dirty="0"/>
-          </a:p>
-          <a:p>
-            <a:r>
-              <a:rPr lang="en-US" altLang="zh-CN" sz="2400" dirty="0"/>
-              <a:t>Unified Physical Register </a:t>
-            </a:r>
-            <a:r>
-              <a:rPr lang="en-US" altLang="zh-CN" sz="2400" dirty="0" smtClean="0"/>
-              <a:t>File</a:t>
-            </a:r>
-          </a:p>
-          <a:p>
-            <a:r>
-              <a:rPr lang="en-US" altLang="zh-CN" sz="2400" dirty="0" smtClean="0"/>
-              <a:t>The Decode Stage</a:t>
-            </a:r>
-          </a:p>
-          <a:p>
-            <a:r>
-              <a:rPr lang="en-US" altLang="zh-CN" sz="2400" dirty="0" smtClean="0"/>
-              <a:t>The Rename Stage</a:t>
-            </a:r>
-          </a:p>
-          <a:p>
-            <a:r>
-              <a:rPr lang="en-US" altLang="zh-CN" sz="2400" dirty="0" smtClean="0"/>
-              <a:t>ROB &amp; The Dispatch Stage </a:t>
-            </a:r>
-            <a:endParaRPr lang="en-US" altLang="zh-CN" sz="2400" dirty="0" smtClean="0"/>
-          </a:p>
-          <a:p>
-            <a:r>
-              <a:rPr lang="en-US" altLang="zh-CN" sz="2400" dirty="0" smtClean="0"/>
-              <a:t>The Issue Unit</a:t>
-            </a:r>
-          </a:p>
-          <a:p>
-            <a:r>
-              <a:rPr lang="en-US" altLang="zh-CN" sz="2400" dirty="0" smtClean="0"/>
-              <a:t>The Register File and Bypass</a:t>
-            </a:r>
-          </a:p>
-          <a:p>
-            <a:r>
               <a:rPr lang="en-US" altLang="zh-CN" sz="2400" dirty="0" smtClean="0">
+                <a:latin typeface="Calibri (正文)"/>
+              </a:rPr>
+              <a:t>BOOM</a:t>
+            </a:r>
+            <a:r>
+              <a:rPr lang="zh-CN" altLang="en-US" sz="2400" dirty="0" smtClean="0">
+                <a:latin typeface="Calibri (正文)"/>
+              </a:rPr>
+              <a:t>使用统一的物理寄存器堆</a:t>
+            </a:r>
+            <a:endParaRPr lang="en-US" altLang="zh-CN" sz="2400" dirty="0" smtClean="0">
+              <a:latin typeface="Calibri (正文)"/>
+            </a:endParaRPr>
+          </a:p>
+          <a:p>
+            <a:pPr lvl="1"/>
+            <a:r>
+              <a:rPr lang="zh-CN" altLang="en-US" sz="2000" dirty="0" smtClean="0">
+                <a:latin typeface="Calibri (正文)"/>
+              </a:rPr>
+              <a:t>同时包含整数寄存器和浮点寄存器</a:t>
+            </a:r>
+            <a:endParaRPr lang="en-US" altLang="zh-CN" sz="2000" dirty="0" smtClean="0">
+              <a:latin typeface="Calibri (正文)"/>
+            </a:endParaRPr>
+          </a:p>
+          <a:p>
+            <a:pPr lvl="1"/>
+            <a:r>
+              <a:rPr lang="zh-CN" altLang="en-US" sz="2000" dirty="0" smtClean="0">
+                <a:latin typeface="Calibri (正文)"/>
+              </a:rPr>
+              <a:t>用映射表实现寄存器重命名</a:t>
+            </a:r>
+            <a:endParaRPr lang="en-US" altLang="zh-CN" sz="2000" dirty="0" smtClean="0">
+              <a:latin typeface="Calibri (正文)"/>
+            </a:endParaRPr>
+          </a:p>
+          <a:p>
+            <a:r>
+              <a:rPr lang="zh-CN" altLang="en-US" sz="2400" dirty="0">
+                <a:latin typeface="Calibri (正文)"/>
+              </a:rPr>
+              <a:t>读写</a:t>
+            </a:r>
+            <a:r>
+              <a:rPr lang="zh-CN" altLang="en-US" sz="2400" dirty="0" smtClean="0">
+                <a:latin typeface="Calibri (正文)"/>
+              </a:rPr>
+              <a:t>口数量</a:t>
+            </a:r>
+            <a:endParaRPr lang="en-US" altLang="zh-CN" sz="2400" dirty="0" smtClean="0">
+              <a:latin typeface="Calibri (正文)"/>
+            </a:endParaRPr>
+          </a:p>
+          <a:p>
+            <a:pPr lvl="1"/>
+            <a:r>
+              <a:rPr lang="zh-CN" altLang="en-US" sz="2000" dirty="0" smtClean="0">
+                <a:latin typeface="Calibri (正文)"/>
+              </a:rPr>
+              <a:t>能满足所有发射的指令</a:t>
+            </a:r>
+            <a:endParaRPr lang="en-US" altLang="zh-CN" sz="2000" dirty="0" smtClean="0">
+              <a:latin typeface="Calibri (正文)"/>
+            </a:endParaRPr>
+          </a:p>
+          <a:p>
+            <a:pPr lvl="1"/>
+            <a:r>
+              <a:rPr lang="zh-CN" altLang="en-US" sz="2000" dirty="0" smtClean="0">
+                <a:latin typeface="Calibri (正文)"/>
+              </a:rPr>
+              <a:t>读写口与发射逻辑的端口对应关系固定</a:t>
+            </a:r>
+            <a:endParaRPr lang="en-US" altLang="zh-CN" sz="2000" dirty="0" smtClean="0">
+              <a:latin typeface="Calibri (正文)"/>
+            </a:endParaRPr>
+          </a:p>
+          <a:p>
+            <a:pPr lvl="1"/>
+            <a:endParaRPr lang="en-US" altLang="zh-CN" sz="2400" dirty="0" smtClean="0">
+              <a:latin typeface="Calibri (正文)"/>
+            </a:endParaRPr>
+          </a:p>
+          <a:p>
+            <a:pPr lvl="1"/>
+            <a:endParaRPr lang="en-US" altLang="zh-CN" sz="2400" dirty="0">
+              <a:latin typeface="Calibri (正文)"/>
+            </a:endParaRPr>
+          </a:p>
+          <a:p>
+            <a:pPr lvl="1"/>
+            <a:endParaRPr lang="en-US" altLang="zh-CN" sz="2400" dirty="0" smtClean="0">
+              <a:latin typeface="Calibri (正文)"/>
+            </a:endParaRPr>
+          </a:p>
+          <a:p>
+            <a:pPr lvl="1"/>
+            <a:endParaRPr lang="en-US" altLang="zh-CN" sz="2400" dirty="0">
+              <a:latin typeface="Calibri (正文)"/>
+            </a:endParaRPr>
+          </a:p>
+          <a:p>
+            <a:pPr lvl="1"/>
+            <a:endParaRPr lang="en-US" altLang="zh-CN" sz="2400" dirty="0" smtClean="0">
+              <a:latin typeface="Calibri (正文)"/>
+            </a:endParaRPr>
+          </a:p>
+          <a:p>
+            <a:r>
+              <a:rPr lang="en-US" altLang="zh-CN" sz="2400" dirty="0">
+                <a:latin typeface="Calibri (正文)"/>
+              </a:rPr>
+              <a:t>Bypass</a:t>
+            </a:r>
+            <a:r>
+              <a:rPr lang="zh-CN" altLang="en-US" sz="2400" dirty="0" smtClean="0">
+                <a:latin typeface="Calibri (正文)"/>
+              </a:rPr>
+              <a:t>在</a:t>
+            </a:r>
+            <a:r>
+              <a:rPr lang="en-US" altLang="zh-CN" sz="2400" dirty="0" smtClean="0">
+                <a:latin typeface="Calibri (正文)"/>
+              </a:rPr>
+              <a:t>Register Read</a:t>
+            </a:r>
+            <a:r>
+              <a:rPr lang="zh-CN" altLang="en-US" sz="2400" dirty="0" smtClean="0">
+                <a:latin typeface="Calibri (正文)"/>
+              </a:rPr>
+              <a:t>阶段最后发生</a:t>
+            </a:r>
+            <a:endParaRPr lang="zh-CN" altLang="en-US" sz="2400" dirty="0">
+              <a:latin typeface="Calibri (正文)"/>
+            </a:endParaRPr>
+          </a:p>
+        </p:txBody>
+      </p:sp>
+      <p:sp>
+        <p:nvSpPr>
+          <p:cNvPr id="5" name="矩形 4"/>
+          <p:cNvSpPr/>
+          <p:nvPr/>
+        </p:nvSpPr>
+        <p:spPr bwMode="auto">
+          <a:xfrm>
+            <a:off x="1405159" y="3501008"/>
+            <a:ext cx="1582665" cy="1800200"/>
+          </a:xfrm>
+          <a:prstGeom prst="rect">
+            <a:avLst/>
+          </a:prstGeom>
+          <a:gradFill rotWithShape="1">
+            <a:gsLst>
+              <a:gs pos="0">
+                <a:schemeClr val="accent1"/>
+              </a:gs>
+              <a:gs pos="100000">
+                <a:schemeClr val="bg1">
+                  <a:alpha val="98000"/>
+                </a:schemeClr>
+              </a:gs>
+            </a:gsLst>
+            <a:lin ang="5400000" scaled="1"/>
+          </a:gradFill>
+          <a:ln w="25400" cap="flat" cmpd="sng" algn="ctr">
+            <a:solidFill>
+              <a:schemeClr val="tx1"/>
+            </a:solidFill>
+            <a:prstDash val="solid"/>
+            <a:round/>
+            <a:headEnd type="none" w="med" len="med"/>
+            <a:tailEnd type="none" w="med" len="med"/>
+          </a:ln>
+          <a:effectLst/>
+        </p:spPr>
+        <p:txBody>
+          <a:bodyPr vert="horz" wrap="square" lIns="0" tIns="0" rIns="0" bIns="0" numCol="1" rtlCol="0" anchor="ctr" anchorCtr="0" compatLnSpc="1">
+            <a:prstTxWarp prst="textNoShape">
+              <a:avLst/>
+            </a:prstTxWarp>
+            <a:noAutofit/>
+          </a:bodyPr>
+          <a:lstStyle/>
+          <a:p>
+            <a:pPr marL="0" marR="0" indent="0" algn="ctr" defTabSz="914400" rtl="0" eaLnBrk="0" fontAlgn="base" latinLnBrk="0" hangingPunct="0">
+              <a:lnSpc>
+                <a:spcPct val="100000"/>
+              </a:lnSpc>
+              <a:spcBef>
+                <a:spcPct val="0"/>
+              </a:spcBef>
+              <a:spcAft>
+                <a:spcPct val="0"/>
+              </a:spcAft>
+              <a:buClrTx/>
+              <a:buSzTx/>
+              <a:buFontTx/>
+              <a:buNone/>
+              <a:tabLst/>
+            </a:pPr>
+            <a:r>
+              <a:rPr kumimoji="0" lang="en-US" altLang="zh-CN" sz="1800" b="1" i="0" u="none" strike="noStrike" cap="none" normalizeH="0" baseline="0" dirty="0" smtClean="0">
+                <a:ln>
+                  <a:noFill/>
+                </a:ln>
                 <a:solidFill>
-                  <a:srgbClr val="FF0000"/>
+                  <a:schemeClr val="tx1"/>
                 </a:solidFill>
-              </a:rPr>
-              <a:t>The Execute Pipeline</a:t>
-            </a:r>
-          </a:p>
-          <a:p>
-            <a:r>
-              <a:rPr lang="en-US" altLang="zh-CN" sz="2400" dirty="0" smtClean="0"/>
-              <a:t>The Load/Store Unit</a:t>
-            </a:r>
-            <a:endParaRPr lang="en-US" altLang="zh-CN" sz="2400" dirty="0" smtClean="0"/>
-          </a:p>
-          <a:p>
-            <a:r>
-              <a:rPr lang="zh-CN" altLang="en-US" sz="2400" dirty="0"/>
-              <a:t>后期工作</a:t>
-            </a:r>
-            <a:r>
-              <a:rPr lang="zh-CN" altLang="en-US" sz="2400" dirty="0" smtClean="0"/>
-              <a:t>安排</a:t>
-            </a:r>
-            <a:endParaRPr lang="en-US" altLang="zh-CN" sz="2400" dirty="0"/>
+                <a:effectLst/>
+                <a:latin typeface="Arial" pitchFamily="34" charset="0"/>
+                <a:ea typeface="宋体" pitchFamily="2" charset="-122"/>
+              </a:rPr>
+              <a:t>REG</a:t>
+            </a:r>
+            <a:endParaRPr kumimoji="0" lang="zh-CN" altLang="en-US" sz="1800" b="1" i="0" u="none" strike="noStrike" cap="none" normalizeH="0" baseline="0" dirty="0" smtClean="0">
+              <a:ln>
+                <a:noFill/>
+              </a:ln>
+              <a:solidFill>
+                <a:schemeClr val="tx1"/>
+              </a:solidFill>
+              <a:effectLst/>
+              <a:latin typeface="Arial" pitchFamily="34" charset="0"/>
+              <a:ea typeface="宋体" pitchFamily="2" charset="-122"/>
+            </a:endParaRPr>
           </a:p>
         </p:txBody>
       </p:sp>
+      <p:sp>
+        <p:nvSpPr>
+          <p:cNvPr id="6" name="矩形 5"/>
+          <p:cNvSpPr/>
+          <p:nvPr/>
+        </p:nvSpPr>
+        <p:spPr bwMode="auto">
+          <a:xfrm>
+            <a:off x="4139952" y="3501008"/>
+            <a:ext cx="1440160" cy="648072"/>
+          </a:xfrm>
+          <a:prstGeom prst="rect">
+            <a:avLst/>
+          </a:prstGeom>
+          <a:gradFill rotWithShape="1">
+            <a:gsLst>
+              <a:gs pos="0">
+                <a:schemeClr val="accent1"/>
+              </a:gs>
+              <a:gs pos="100000">
+                <a:schemeClr val="bg1">
+                  <a:alpha val="98000"/>
+                </a:schemeClr>
+              </a:gs>
+            </a:gsLst>
+            <a:lin ang="5400000" scaled="1"/>
+          </a:gradFill>
+          <a:ln w="25400" cap="flat" cmpd="sng" algn="ctr">
+            <a:solidFill>
+              <a:schemeClr val="tx1"/>
+            </a:solidFill>
+            <a:prstDash val="solid"/>
+            <a:round/>
+            <a:headEnd type="none" w="med" len="med"/>
+            <a:tailEnd type="none" w="med" len="med"/>
+          </a:ln>
+          <a:effectLst/>
+        </p:spPr>
+        <p:txBody>
+          <a:bodyPr vert="horz" wrap="none" lIns="0" tIns="0" rIns="0" bIns="0" numCol="1" rtlCol="0" anchor="ctr" anchorCtr="0" compatLnSpc="1">
+            <a:prstTxWarp prst="textNoShape">
+              <a:avLst/>
+            </a:prstTxWarp>
+            <a:noAutofit/>
+          </a:bodyPr>
+          <a:lstStyle/>
+          <a:p>
+            <a:pPr marL="0" marR="0" indent="0" algn="ctr" defTabSz="914400" rtl="0" eaLnBrk="0" fontAlgn="base" latinLnBrk="0" hangingPunct="0">
+              <a:lnSpc>
+                <a:spcPct val="100000"/>
+              </a:lnSpc>
+              <a:spcBef>
+                <a:spcPct val="0"/>
+              </a:spcBef>
+              <a:spcAft>
+                <a:spcPct val="0"/>
+              </a:spcAft>
+              <a:buClrTx/>
+              <a:buSzTx/>
+              <a:buFontTx/>
+              <a:buNone/>
+              <a:tabLst/>
+            </a:pPr>
+            <a:r>
+              <a:rPr kumimoji="0" lang="en-US" altLang="zh-CN" sz="1800" b="1" i="0" u="none" strike="noStrike" cap="none" normalizeH="0" baseline="0" dirty="0" smtClean="0">
+                <a:ln>
+                  <a:noFill/>
+                </a:ln>
+                <a:solidFill>
+                  <a:schemeClr val="tx1"/>
+                </a:solidFill>
+                <a:effectLst/>
+                <a:latin typeface="Arial" pitchFamily="34" charset="0"/>
+                <a:ea typeface="宋体" pitchFamily="2" charset="-122"/>
+              </a:rPr>
+              <a:t>ALU</a:t>
+            </a:r>
+            <a:endParaRPr kumimoji="0" lang="zh-CN" altLang="en-US" sz="1800" b="1" i="0" u="none" strike="noStrike" cap="none" normalizeH="0" baseline="0" dirty="0" smtClean="0">
+              <a:ln>
+                <a:noFill/>
+              </a:ln>
+              <a:solidFill>
+                <a:schemeClr val="tx1"/>
+              </a:solidFill>
+              <a:effectLst/>
+              <a:latin typeface="Arial" pitchFamily="34" charset="0"/>
+              <a:ea typeface="宋体" pitchFamily="2" charset="-122"/>
+            </a:endParaRPr>
+          </a:p>
+        </p:txBody>
+      </p:sp>
+      <p:sp>
+        <p:nvSpPr>
+          <p:cNvPr id="7" name="矩形 6"/>
+          <p:cNvSpPr/>
+          <p:nvPr/>
+        </p:nvSpPr>
+        <p:spPr bwMode="auto">
+          <a:xfrm>
+            <a:off x="4139952" y="4293096"/>
+            <a:ext cx="1440160" cy="1006577"/>
+          </a:xfrm>
+          <a:prstGeom prst="rect">
+            <a:avLst/>
+          </a:prstGeom>
+          <a:gradFill rotWithShape="1">
+            <a:gsLst>
+              <a:gs pos="0">
+                <a:schemeClr val="accent1"/>
+              </a:gs>
+              <a:gs pos="100000">
+                <a:schemeClr val="bg1">
+                  <a:alpha val="98000"/>
+                </a:schemeClr>
+              </a:gs>
+            </a:gsLst>
+            <a:lin ang="5400000" scaled="1"/>
+          </a:gradFill>
+          <a:ln w="25400" cap="flat" cmpd="sng" algn="ctr">
+            <a:solidFill>
+              <a:schemeClr val="tx1"/>
+            </a:solidFill>
+            <a:prstDash val="solid"/>
+            <a:round/>
+            <a:headEnd type="none" w="med" len="med"/>
+            <a:tailEnd type="none" w="med" len="med"/>
+          </a:ln>
+          <a:effectLst/>
+        </p:spPr>
+        <p:txBody>
+          <a:bodyPr vert="horz" wrap="none" lIns="0" tIns="0" rIns="0" bIns="0" numCol="1" rtlCol="0" anchor="ctr" anchorCtr="0" compatLnSpc="1">
+            <a:prstTxWarp prst="textNoShape">
+              <a:avLst/>
+            </a:prstTxWarp>
+            <a:noAutofit/>
+          </a:bodyPr>
+          <a:lstStyle/>
+          <a:p>
+            <a:pPr marL="0" marR="0" indent="0" algn="ctr" defTabSz="914400" rtl="0" eaLnBrk="0" fontAlgn="base" latinLnBrk="0" hangingPunct="0">
+              <a:lnSpc>
+                <a:spcPct val="100000"/>
+              </a:lnSpc>
+              <a:spcBef>
+                <a:spcPct val="0"/>
+              </a:spcBef>
+              <a:spcAft>
+                <a:spcPct val="0"/>
+              </a:spcAft>
+              <a:buClrTx/>
+              <a:buSzTx/>
+              <a:buFontTx/>
+              <a:buNone/>
+              <a:tabLst/>
+            </a:pPr>
+            <a:r>
+              <a:rPr kumimoji="0" lang="en-US" altLang="zh-CN" sz="1800" b="1" i="0" u="none" strike="noStrike" cap="none" normalizeH="0" baseline="0" dirty="0" smtClean="0">
+                <a:ln>
+                  <a:noFill/>
+                </a:ln>
+                <a:solidFill>
+                  <a:schemeClr val="tx1"/>
+                </a:solidFill>
+                <a:effectLst/>
+                <a:latin typeface="Arial" pitchFamily="34" charset="0"/>
+                <a:ea typeface="宋体" pitchFamily="2" charset="-122"/>
+              </a:rPr>
+              <a:t>FPU</a:t>
+            </a:r>
+            <a:endParaRPr kumimoji="0" lang="zh-CN" altLang="en-US" sz="1800" b="1" i="0" u="none" strike="noStrike" cap="none" normalizeH="0" baseline="0" dirty="0" smtClean="0">
+              <a:ln>
+                <a:noFill/>
+              </a:ln>
+              <a:solidFill>
+                <a:schemeClr val="tx1"/>
+              </a:solidFill>
+              <a:effectLst/>
+              <a:latin typeface="Arial" pitchFamily="34" charset="0"/>
+              <a:ea typeface="宋体" pitchFamily="2" charset="-122"/>
+            </a:endParaRPr>
+          </a:p>
+        </p:txBody>
+      </p:sp>
+      <p:cxnSp>
+        <p:nvCxnSpPr>
+          <p:cNvPr id="9" name="直接箭头连接符 8"/>
+          <p:cNvCxnSpPr/>
+          <p:nvPr/>
+        </p:nvCxnSpPr>
+        <p:spPr bwMode="auto">
+          <a:xfrm>
+            <a:off x="2987824" y="3645024"/>
+            <a:ext cx="1152128" cy="0"/>
+          </a:xfrm>
+          <a:prstGeom prst="straightConnector1">
+            <a:avLst/>
+          </a:prstGeom>
+          <a:gradFill rotWithShape="1">
+            <a:gsLst>
+              <a:gs pos="0">
+                <a:schemeClr val="accent1"/>
+              </a:gs>
+              <a:gs pos="100000">
+                <a:schemeClr val="bg1">
+                  <a:alpha val="98000"/>
+                </a:schemeClr>
+              </a:gs>
+            </a:gsLst>
+            <a:lin ang="5400000" scaled="1"/>
+          </a:gradFill>
+          <a:ln w="57150" cap="flat" cmpd="sng" algn="ctr">
+            <a:solidFill>
+              <a:schemeClr val="tx1"/>
+            </a:solidFill>
+            <a:prstDash val="solid"/>
+            <a:round/>
+            <a:headEnd type="none" w="med" len="med"/>
+            <a:tailEnd type="triangle"/>
+          </a:ln>
+          <a:effectLst/>
+        </p:spPr>
+      </p:cxnSp>
+      <p:cxnSp>
+        <p:nvCxnSpPr>
+          <p:cNvPr id="10" name="直接箭头连接符 9"/>
+          <p:cNvCxnSpPr/>
+          <p:nvPr/>
+        </p:nvCxnSpPr>
+        <p:spPr bwMode="auto">
+          <a:xfrm>
+            <a:off x="2987824" y="3933056"/>
+            <a:ext cx="1152128" cy="0"/>
+          </a:xfrm>
+          <a:prstGeom prst="straightConnector1">
+            <a:avLst/>
+          </a:prstGeom>
+          <a:gradFill rotWithShape="1">
+            <a:gsLst>
+              <a:gs pos="0">
+                <a:schemeClr val="accent1"/>
+              </a:gs>
+              <a:gs pos="100000">
+                <a:schemeClr val="bg1">
+                  <a:alpha val="98000"/>
+                </a:schemeClr>
+              </a:gs>
+            </a:gsLst>
+            <a:lin ang="5400000" scaled="1"/>
+          </a:gradFill>
+          <a:ln w="57150" cap="flat" cmpd="sng" algn="ctr">
+            <a:solidFill>
+              <a:schemeClr val="tx1"/>
+            </a:solidFill>
+            <a:prstDash val="solid"/>
+            <a:round/>
+            <a:headEnd type="none" w="med" len="med"/>
+            <a:tailEnd type="triangle"/>
+          </a:ln>
+          <a:effectLst/>
+        </p:spPr>
+      </p:cxnSp>
+      <p:cxnSp>
+        <p:nvCxnSpPr>
+          <p:cNvPr id="11" name="直接箭头连接符 10"/>
+          <p:cNvCxnSpPr/>
+          <p:nvPr/>
+        </p:nvCxnSpPr>
+        <p:spPr bwMode="auto">
+          <a:xfrm>
+            <a:off x="2987824" y="4509120"/>
+            <a:ext cx="1152128" cy="0"/>
+          </a:xfrm>
+          <a:prstGeom prst="straightConnector1">
+            <a:avLst/>
+          </a:prstGeom>
+          <a:gradFill rotWithShape="1">
+            <a:gsLst>
+              <a:gs pos="0">
+                <a:schemeClr val="accent1"/>
+              </a:gs>
+              <a:gs pos="100000">
+                <a:schemeClr val="bg1">
+                  <a:alpha val="98000"/>
+                </a:schemeClr>
+              </a:gs>
+            </a:gsLst>
+            <a:lin ang="5400000" scaled="1"/>
+          </a:gradFill>
+          <a:ln w="57150" cap="flat" cmpd="sng" algn="ctr">
+            <a:solidFill>
+              <a:schemeClr val="tx1"/>
+            </a:solidFill>
+            <a:prstDash val="solid"/>
+            <a:round/>
+            <a:headEnd type="none" w="med" len="med"/>
+            <a:tailEnd type="triangle"/>
+          </a:ln>
+          <a:effectLst/>
+        </p:spPr>
+      </p:cxnSp>
+      <p:cxnSp>
+        <p:nvCxnSpPr>
+          <p:cNvPr id="12" name="直接箭头连接符 11"/>
+          <p:cNvCxnSpPr/>
+          <p:nvPr/>
+        </p:nvCxnSpPr>
+        <p:spPr bwMode="auto">
+          <a:xfrm>
+            <a:off x="2987824" y="4797152"/>
+            <a:ext cx="1152128" cy="0"/>
+          </a:xfrm>
+          <a:prstGeom prst="straightConnector1">
+            <a:avLst/>
+          </a:prstGeom>
+          <a:gradFill rotWithShape="1">
+            <a:gsLst>
+              <a:gs pos="0">
+                <a:schemeClr val="accent1"/>
+              </a:gs>
+              <a:gs pos="100000">
+                <a:schemeClr val="bg1">
+                  <a:alpha val="98000"/>
+                </a:schemeClr>
+              </a:gs>
+            </a:gsLst>
+            <a:lin ang="5400000" scaled="1"/>
+          </a:gradFill>
+          <a:ln w="57150" cap="flat" cmpd="sng" algn="ctr">
+            <a:solidFill>
+              <a:schemeClr val="tx1"/>
+            </a:solidFill>
+            <a:prstDash val="solid"/>
+            <a:round/>
+            <a:headEnd type="none" w="med" len="med"/>
+            <a:tailEnd type="triangle"/>
+          </a:ln>
+          <a:effectLst/>
+        </p:spPr>
+      </p:cxnSp>
+      <p:cxnSp>
+        <p:nvCxnSpPr>
+          <p:cNvPr id="13" name="直接箭头连接符 12"/>
+          <p:cNvCxnSpPr/>
+          <p:nvPr/>
+        </p:nvCxnSpPr>
+        <p:spPr bwMode="auto">
+          <a:xfrm>
+            <a:off x="2987824" y="5085184"/>
+            <a:ext cx="1152128" cy="0"/>
+          </a:xfrm>
+          <a:prstGeom prst="straightConnector1">
+            <a:avLst/>
+          </a:prstGeom>
+          <a:gradFill rotWithShape="1">
+            <a:gsLst>
+              <a:gs pos="0">
+                <a:schemeClr val="accent1"/>
+              </a:gs>
+              <a:gs pos="100000">
+                <a:schemeClr val="bg1">
+                  <a:alpha val="98000"/>
+                </a:schemeClr>
+              </a:gs>
+            </a:gsLst>
+            <a:lin ang="5400000" scaled="1"/>
+          </a:gradFill>
+          <a:ln w="57150" cap="flat" cmpd="sng" algn="ctr">
+            <a:solidFill>
+              <a:schemeClr val="tx1"/>
+            </a:solidFill>
+            <a:prstDash val="solid"/>
+            <a:round/>
+            <a:headEnd type="none" w="med" len="med"/>
+            <a:tailEnd type="triangle"/>
+          </a:ln>
+          <a:effectLst/>
+        </p:spPr>
+      </p:cxnSp>
+      <p:sp>
+        <p:nvSpPr>
+          <p:cNvPr id="14" name="矩形 13"/>
+          <p:cNvSpPr/>
+          <p:nvPr/>
+        </p:nvSpPr>
+        <p:spPr bwMode="auto">
+          <a:xfrm>
+            <a:off x="6588224" y="3499473"/>
+            <a:ext cx="1582665" cy="1800200"/>
+          </a:xfrm>
+          <a:prstGeom prst="rect">
+            <a:avLst/>
+          </a:prstGeom>
+          <a:gradFill rotWithShape="1">
+            <a:gsLst>
+              <a:gs pos="0">
+                <a:schemeClr val="accent1"/>
+              </a:gs>
+              <a:gs pos="100000">
+                <a:schemeClr val="bg1">
+                  <a:alpha val="98000"/>
+                </a:schemeClr>
+              </a:gs>
+            </a:gsLst>
+            <a:lin ang="5400000" scaled="1"/>
+          </a:gradFill>
+          <a:ln w="25400" cap="flat" cmpd="sng" algn="ctr">
+            <a:solidFill>
+              <a:schemeClr val="tx1"/>
+            </a:solidFill>
+            <a:prstDash val="solid"/>
+            <a:round/>
+            <a:headEnd type="none" w="med" len="med"/>
+            <a:tailEnd type="none" w="med" len="med"/>
+          </a:ln>
+          <a:effectLst/>
+        </p:spPr>
+        <p:txBody>
+          <a:bodyPr vert="horz" wrap="square" lIns="0" tIns="0" rIns="0" bIns="0" numCol="1" rtlCol="0" anchor="ctr" anchorCtr="0" compatLnSpc="1">
+            <a:prstTxWarp prst="textNoShape">
+              <a:avLst/>
+            </a:prstTxWarp>
+            <a:noAutofit/>
+          </a:bodyPr>
+          <a:lstStyle/>
+          <a:p>
+            <a:pPr marL="0" marR="0" indent="0" algn="ctr" defTabSz="914400" rtl="0" eaLnBrk="0" fontAlgn="base" latinLnBrk="0" hangingPunct="0">
+              <a:lnSpc>
+                <a:spcPct val="100000"/>
+              </a:lnSpc>
+              <a:spcBef>
+                <a:spcPct val="0"/>
+              </a:spcBef>
+              <a:spcAft>
+                <a:spcPct val="0"/>
+              </a:spcAft>
+              <a:buClrTx/>
+              <a:buSzTx/>
+              <a:buFontTx/>
+              <a:buNone/>
+              <a:tabLst/>
+            </a:pPr>
+            <a:r>
+              <a:rPr kumimoji="0" lang="en-US" altLang="zh-CN" sz="1800" b="1" i="0" u="none" strike="noStrike" cap="none" normalizeH="0" baseline="0" dirty="0" smtClean="0">
+                <a:ln>
+                  <a:noFill/>
+                </a:ln>
+                <a:solidFill>
+                  <a:schemeClr val="tx1"/>
+                </a:solidFill>
+                <a:effectLst/>
+                <a:latin typeface="Arial" pitchFamily="34" charset="0"/>
+                <a:ea typeface="宋体" pitchFamily="2" charset="-122"/>
+              </a:rPr>
+              <a:t>Issue</a:t>
+            </a:r>
+          </a:p>
+          <a:p>
+            <a:pPr marL="0" marR="0" indent="0" algn="ctr" defTabSz="914400" rtl="0" eaLnBrk="0" fontAlgn="base" latinLnBrk="0" hangingPunct="0">
+              <a:lnSpc>
+                <a:spcPct val="100000"/>
+              </a:lnSpc>
+              <a:spcBef>
+                <a:spcPct val="0"/>
+              </a:spcBef>
+              <a:spcAft>
+                <a:spcPct val="0"/>
+              </a:spcAft>
+              <a:buClrTx/>
+              <a:buSzTx/>
+              <a:buFontTx/>
+              <a:buNone/>
+              <a:tabLst/>
+            </a:pPr>
+            <a:r>
+              <a:rPr lang="en-US" altLang="zh-CN" dirty="0" smtClean="0">
+                <a:solidFill>
+                  <a:schemeClr val="tx1"/>
+                </a:solidFill>
+              </a:rPr>
+              <a:t>Logic</a:t>
+            </a:r>
+            <a:endParaRPr kumimoji="0" lang="zh-CN" altLang="en-US" sz="1800" b="1" i="0" u="none" strike="noStrike" cap="none" normalizeH="0" baseline="0" dirty="0" smtClean="0">
+              <a:ln>
+                <a:noFill/>
+              </a:ln>
+              <a:solidFill>
+                <a:schemeClr val="tx1"/>
+              </a:solidFill>
+              <a:effectLst/>
+              <a:latin typeface="Arial" pitchFamily="34" charset="0"/>
+              <a:ea typeface="宋体" pitchFamily="2" charset="-122"/>
+            </a:endParaRPr>
+          </a:p>
+        </p:txBody>
+      </p:sp>
+      <p:cxnSp>
+        <p:nvCxnSpPr>
+          <p:cNvPr id="15" name="直接箭头连接符 14"/>
+          <p:cNvCxnSpPr>
+            <a:endCxn id="6" idx="3"/>
+          </p:cNvCxnSpPr>
+          <p:nvPr/>
+        </p:nvCxnSpPr>
+        <p:spPr bwMode="auto">
+          <a:xfrm flipH="1">
+            <a:off x="5580112" y="3825044"/>
+            <a:ext cx="1008112" cy="0"/>
+          </a:xfrm>
+          <a:prstGeom prst="straightConnector1">
+            <a:avLst/>
+          </a:prstGeom>
+          <a:gradFill rotWithShape="1">
+            <a:gsLst>
+              <a:gs pos="0">
+                <a:schemeClr val="accent1"/>
+              </a:gs>
+              <a:gs pos="100000">
+                <a:schemeClr val="bg1">
+                  <a:alpha val="98000"/>
+                </a:schemeClr>
+              </a:gs>
+            </a:gsLst>
+            <a:lin ang="5400000" scaled="1"/>
+          </a:gradFill>
+          <a:ln w="57150" cap="flat" cmpd="sng" algn="ctr">
+            <a:solidFill>
+              <a:schemeClr val="tx1"/>
+            </a:solidFill>
+            <a:prstDash val="solid"/>
+            <a:round/>
+            <a:headEnd type="none" w="med" len="med"/>
+            <a:tailEnd type="triangle"/>
+          </a:ln>
+          <a:effectLst/>
+        </p:spPr>
+      </p:cxnSp>
+      <p:cxnSp>
+        <p:nvCxnSpPr>
+          <p:cNvPr id="20" name="直接箭头连接符 19"/>
+          <p:cNvCxnSpPr/>
+          <p:nvPr/>
+        </p:nvCxnSpPr>
+        <p:spPr bwMode="auto">
+          <a:xfrm flipH="1">
+            <a:off x="5580112" y="4796384"/>
+            <a:ext cx="1008112" cy="0"/>
+          </a:xfrm>
+          <a:prstGeom prst="straightConnector1">
+            <a:avLst/>
+          </a:prstGeom>
+          <a:gradFill rotWithShape="1">
+            <a:gsLst>
+              <a:gs pos="0">
+                <a:schemeClr val="accent1"/>
+              </a:gs>
+              <a:gs pos="100000">
+                <a:schemeClr val="bg1">
+                  <a:alpha val="98000"/>
+                </a:schemeClr>
+              </a:gs>
+            </a:gsLst>
+            <a:lin ang="5400000" scaled="1"/>
+          </a:gradFill>
+          <a:ln w="57150" cap="flat" cmpd="sng" algn="ctr">
+            <a:solidFill>
+              <a:schemeClr val="tx1"/>
+            </a:solidFill>
+            <a:prstDash val="solid"/>
+            <a:round/>
+            <a:headEnd type="none" w="med" len="med"/>
+            <a:tailEnd type="triangle"/>
+          </a:ln>
+          <a:effectLst/>
+        </p:spPr>
+      </p:cxnSp>
     </p:spTree>
     <p:extLst>
       <p:ext uri="{BB962C8B-B14F-4D97-AF65-F5344CB8AC3E}">
-        <p14:creationId xmlns:p14="http://schemas.microsoft.com/office/powerpoint/2010/main" val="268455510"/>
+        <p14:creationId xmlns:p14="http://schemas.microsoft.com/office/powerpoint/2010/main" val="2099892906"/>
       </p:ext>
     </p:extLst>
   </p:cSld>
@@ -9668,12 +10949,8 @@
           <a:lstStyle/>
           <a:p>
             <a:r>
-              <a:rPr lang="en-US" altLang="zh-CN" dirty="0"/>
-              <a:t>The Execute </a:t>
-            </a:r>
-            <a:r>
-              <a:rPr lang="en-US" altLang="zh-CN" dirty="0" smtClean="0"/>
-              <a:t>Pipeline</a:t>
+              <a:rPr lang="zh-CN" altLang="en-US" dirty="0" smtClean="0"/>
+              <a:t>主要内容</a:t>
             </a:r>
             <a:endParaRPr lang="zh-CN" altLang="en-US" dirty="0"/>
           </a:p>
@@ -9694,22 +10971,104 @@
           <a:bodyPr/>
           <a:lstStyle/>
           <a:p>
-            <a:endParaRPr lang="zh-CN" altLang="en-US" sz="2400" dirty="0">
-              <a:latin typeface="Calibri (正文)"/>
-            </a:endParaRPr>
+            <a:r>
+              <a:rPr lang="en-US" altLang="zh-CN" sz="2400" dirty="0" smtClean="0"/>
+              <a:t>Introduction &amp; Overview</a:t>
+            </a:r>
+          </a:p>
+          <a:p>
+            <a:r>
+              <a:rPr lang="en-US" altLang="zh-CN" sz="2400" dirty="0" smtClean="0"/>
+              <a:t>Instruction Fetch</a:t>
+            </a:r>
+            <a:endParaRPr lang="zh-CN" altLang="en-US" sz="2400" dirty="0"/>
+          </a:p>
+          <a:p>
+            <a:r>
+              <a:rPr lang="en-US" altLang="zh-CN" sz="2400" dirty="0"/>
+              <a:t>Unified Physical Register </a:t>
+            </a:r>
+            <a:r>
+              <a:rPr lang="en-US" altLang="zh-CN" sz="2400" dirty="0" smtClean="0"/>
+              <a:t>File</a:t>
+            </a:r>
+          </a:p>
+          <a:p>
+            <a:r>
+              <a:rPr lang="en-US" altLang="zh-CN" sz="2400" dirty="0" smtClean="0"/>
+              <a:t>The Decode Stage</a:t>
+            </a:r>
+          </a:p>
+          <a:p>
+            <a:r>
+              <a:rPr lang="en-US" altLang="zh-CN" sz="2400" dirty="0" smtClean="0"/>
+              <a:t>The Rename Stage</a:t>
+            </a:r>
+          </a:p>
+          <a:p>
+            <a:r>
+              <a:rPr lang="en-US" altLang="zh-CN" sz="2400" dirty="0" smtClean="0"/>
+              <a:t>ROB &amp; The Dispatch Stage </a:t>
+            </a:r>
+          </a:p>
+          <a:p>
+            <a:r>
+              <a:rPr lang="en-US" altLang="zh-CN" sz="2400" dirty="0" smtClean="0"/>
+              <a:t>The Issue Unit</a:t>
+            </a:r>
+          </a:p>
+          <a:p>
+            <a:r>
+              <a:rPr lang="en-US" altLang="zh-CN" sz="2400" dirty="0" smtClean="0"/>
+              <a:t>The Register File and Bypass</a:t>
+            </a:r>
+          </a:p>
+          <a:p>
+            <a:r>
+              <a:rPr lang="en-US" altLang="zh-CN" sz="2400" dirty="0" smtClean="0">
+                <a:solidFill>
+                  <a:srgbClr val="FF0000"/>
+                </a:solidFill>
+              </a:rPr>
+              <a:t>The Execute Pipeline</a:t>
+            </a:r>
+          </a:p>
+          <a:p>
+            <a:r>
+              <a:rPr lang="en-US" altLang="zh-CN" sz="2400" dirty="0" smtClean="0"/>
+              <a:t>The Load/Store Unit</a:t>
+            </a:r>
+          </a:p>
+          <a:p>
+            <a:r>
+              <a:rPr lang="zh-CN" altLang="en-US" sz="2400" dirty="0"/>
+              <a:t>后期工作</a:t>
+            </a:r>
+            <a:r>
+              <a:rPr lang="zh-CN" altLang="en-US" sz="2400" dirty="0" smtClean="0"/>
+              <a:t>安排</a:t>
+            </a:r>
+            <a:endParaRPr lang="en-US" altLang="zh-CN" sz="2400" dirty="0"/>
           </a:p>
         </p:txBody>
       </p:sp>
     </p:spTree>
     <p:extLst>
       <p:ext uri="{BB962C8B-B14F-4D97-AF65-F5344CB8AC3E}">
-        <p14:creationId xmlns:p14="http://schemas.microsoft.com/office/powerpoint/2010/main" val="1581037433"/>
+        <p14:creationId xmlns:p14="http://schemas.microsoft.com/office/powerpoint/2010/main" val="268455510"/>
       </p:ext>
     </p:extLst>
   </p:cSld>
   <p:clrMapOvr>
     <a:masterClrMapping/>
   </p:clrMapOvr>
+  <p:timing>
+    <p:tnLst>
+      <p:par>
+        <p:cTn id="1" dur="indefinite" restart="never" nodeType="tmRoot"/>
+      </p:par>
+    </p:tnLst>
+  </p:timing>
 </p:sld>
 </file>
 
@@ -9746,8 +11105,12 @@
           <a:lstStyle/>
           <a:p>
             <a:r>
-              <a:rPr lang="zh-CN" altLang="en-US" dirty="0" smtClean="0"/>
-              <a:t>主要内容</a:t>
+              <a:rPr lang="en-US" altLang="zh-CN" dirty="0"/>
+              <a:t>The Execute </a:t>
+            </a:r>
+            <a:r>
+              <a:rPr lang="en-US" altLang="zh-CN" dirty="0" smtClean="0"/>
+              <a:t>Pipeline</a:t>
             </a:r>
             <a:endParaRPr lang="zh-CN" altLang="en-US" dirty="0"/>
           </a:p>
@@ -9769,6 +11132,119 @@
           <a:lstStyle/>
           <a:p>
             <a:r>
+              <a:rPr lang="en-US" altLang="zh-CN" sz="2400" dirty="0" smtClean="0">
+                <a:latin typeface="Calibri (正文)"/>
+              </a:rPr>
+              <a:t>Execution Pipeline</a:t>
+            </a:r>
+          </a:p>
+          <a:p>
+            <a:r>
+              <a:rPr lang="en-US" altLang="zh-CN" sz="2400" dirty="0" smtClean="0">
+                <a:latin typeface="Calibri (正文)"/>
+              </a:rPr>
+              <a:t>Execution Unit</a:t>
+            </a:r>
+            <a:endParaRPr lang="en-US" altLang="zh-CN" sz="2400" dirty="0">
+              <a:latin typeface="Calibri (正文)"/>
+            </a:endParaRPr>
+          </a:p>
+          <a:p>
+            <a:r>
+              <a:rPr lang="en-US" altLang="zh-CN" sz="2400" dirty="0" smtClean="0">
+                <a:latin typeface="Calibri (正文)"/>
+              </a:rPr>
+              <a:t>EU</a:t>
+            </a:r>
+            <a:r>
+              <a:rPr lang="zh-CN" altLang="en-US" sz="2400" dirty="0" smtClean="0">
+                <a:latin typeface="Calibri (正文)"/>
+              </a:rPr>
+              <a:t>包含的</a:t>
+            </a:r>
+            <a:r>
+              <a:rPr lang="en-US" altLang="zh-CN" sz="2400" dirty="0" smtClean="0">
+                <a:latin typeface="Calibri (正文)"/>
+              </a:rPr>
+              <a:t>Function Unit</a:t>
+            </a:r>
+          </a:p>
+          <a:p>
+            <a:endParaRPr lang="zh-CN" altLang="en-US" sz="2400" dirty="0">
+              <a:latin typeface="Calibri (正文)"/>
+            </a:endParaRPr>
+          </a:p>
+        </p:txBody>
+      </p:sp>
+    </p:spTree>
+    <p:extLst>
+      <p:ext uri="{BB962C8B-B14F-4D97-AF65-F5344CB8AC3E}">
+        <p14:creationId xmlns:p14="http://schemas.microsoft.com/office/powerpoint/2010/main" val="1581037433"/>
+      </p:ext>
+    </p:extLst>
+  </p:cSld>
+  <p:clrMapOvr>
+    <a:masterClrMapping/>
+  </p:clrMapOvr>
+</p:sld>
+</file>
+
+<file path=ppt/slides/slide24.xml><?xml version="1.0" encoding="utf-8"?>
+<p:sld xmlns:a="http://schemas.openxmlformats.org/drawingml/2006/main" xmlns:r="http://schemas.openxmlformats.org/officeDocument/2006/relationships" xmlns:p="http://schemas.openxmlformats.org/presentationml/2006/main">
+  <p:cSld>
+    <p:spTree>
+      <p:nvGrpSpPr>
+        <p:cNvPr id="1" name=""/>
+        <p:cNvGrpSpPr/>
+        <p:nvPr/>
+      </p:nvGrpSpPr>
+      <p:grpSpPr>
+        <a:xfrm>
+          <a:off x="0" y="0"/>
+          <a:ext cx="0" cy="0"/>
+          <a:chOff x="0" y="0"/>
+          <a:chExt cx="0" cy="0"/>
+        </a:xfrm>
+      </p:grpSpPr>
+      <p:sp>
+        <p:nvSpPr>
+          <p:cNvPr id="2" name="标题 1"/>
+          <p:cNvSpPr>
+            <a:spLocks noGrp="1"/>
+          </p:cNvSpPr>
+          <p:nvPr>
+            <p:ph type="title"/>
+          </p:nvPr>
+        </p:nvSpPr>
+        <p:spPr/>
+        <p:txBody>
+          <a:bodyPr/>
+          <a:lstStyle/>
+          <a:p>
+            <a:r>
+              <a:rPr lang="zh-CN" altLang="en-US" dirty="0" smtClean="0"/>
+              <a:t>主要内容</a:t>
+            </a:r>
+            <a:endParaRPr lang="zh-CN" altLang="en-US" dirty="0"/>
+          </a:p>
+        </p:txBody>
+      </p:sp>
+      <p:sp>
+        <p:nvSpPr>
+          <p:cNvPr id="3" name="内容占位符 2"/>
+          <p:cNvSpPr>
+            <a:spLocks noGrp="1"/>
+          </p:cNvSpPr>
+          <p:nvPr>
+            <p:ph idx="1"/>
+          </p:nvPr>
+        </p:nvSpPr>
+        <p:spPr/>
+        <p:txBody>
+          <a:bodyPr/>
+          <a:lstStyle/>
+          <a:p>
+            <a:r>
               <a:rPr lang="en-US" altLang="zh-CN" sz="2400" dirty="0" smtClean="0"/>
               <a:t>Introduction &amp; Overview</a:t>
             </a:r>
@@ -9807,7 +11283,6 @@
               <a:rPr lang="en-US" altLang="zh-CN" sz="2400" dirty="0" smtClean="0"/>
               <a:t>ROB &amp; The Dispatch Stage </a:t>
             </a:r>
-            <a:endParaRPr lang="en-US" altLang="zh-CN" sz="2400" dirty="0" smtClean="0"/>
           </a:p>
           <a:p>
             <a:r>
@@ -9836,11 +11311,6 @@
               </a:rPr>
               <a:t>The Load/Store Unit</a:t>
             </a:r>
-            <a:endParaRPr lang="en-US" altLang="zh-CN" sz="2400" dirty="0" smtClean="0">
-              <a:solidFill>
-                <a:srgbClr val="FF0000"/>
-              </a:solidFill>
-            </a:endParaRPr>
           </a:p>
           <a:p>
             <a:r>
@@ -9875,84 +11345,6 @@
 </p:sld>
 </file>
 
-<file path=ppt/slides/slide24.xml><?xml version="1.0" encoding="utf-8"?>
-<p:sld xmlns:a="http://schemas.openxmlformats.org/drawingml/2006/main" xmlns:r="http://schemas.openxmlformats.org/officeDocument/2006/relationships" xmlns:p="http://schemas.openxmlformats.org/presentationml/2006/main">
-  <p:cSld>
-    <p:spTree>
-      <p:nvGrpSpPr>
-        <p:cNvPr id="1" name=""/>
-        <p:cNvGrpSpPr/>
-        <p:nvPr/>
-      </p:nvGrpSpPr>
-      <p:grpSpPr>
-        <a:xfrm>
-          <a:off x="0" y="0"/>
-          <a:ext cx="0" cy="0"/>
-          <a:chOff x="0" y="0"/>
-          <a:chExt cx="0" cy="0"/>
-        </a:xfrm>
-      </p:grpSpPr>
-      <p:sp>
-        <p:nvSpPr>
-          <p:cNvPr id="2" name="标题 1"/>
-          <p:cNvSpPr>
-            <a:spLocks noGrp="1"/>
-          </p:cNvSpPr>
-          <p:nvPr>
-            <p:ph type="title"/>
-          </p:nvPr>
-        </p:nvSpPr>
-        <p:spPr/>
-        <p:txBody>
-          <a:bodyPr/>
-          <a:lstStyle/>
-          <a:p>
-            <a:r>
-              <a:rPr lang="en-US" altLang="zh-CN" dirty="0"/>
-              <a:t>The Load/Store </a:t>
-            </a:r>
-            <a:r>
-              <a:rPr lang="en-US" altLang="zh-CN" dirty="0" smtClean="0"/>
-              <a:t>Unit</a:t>
-            </a:r>
-            <a:endParaRPr lang="zh-CN" altLang="en-US" dirty="0"/>
-          </a:p>
-        </p:txBody>
-      </p:sp>
-      <p:sp>
-        <p:nvSpPr>
-          <p:cNvPr id="3" name="内容占位符 2"/>
-          <p:cNvSpPr>
-            <a:spLocks noGrp="1"/>
-          </p:cNvSpPr>
-          <p:nvPr>
-            <p:ph idx="1"/>
-          </p:nvPr>
-        </p:nvSpPr>
-        <p:spPr/>
-        <p:txBody>
-          <a:bodyPr/>
-          <a:lstStyle/>
-          <a:p>
-            <a:endParaRPr lang="zh-CN" altLang="en-US" sz="2400" dirty="0">
-              <a:latin typeface="Calibri (正文)"/>
-            </a:endParaRPr>
-          </a:p>
-        </p:txBody>
-      </p:sp>
-    </p:spTree>
-    <p:extLst>
-      <p:ext uri="{BB962C8B-B14F-4D97-AF65-F5344CB8AC3E}">
-        <p14:creationId xmlns:p14="http://schemas.microsoft.com/office/powerpoint/2010/main" val="2642976620"/>
-      </p:ext>
-    </p:extLst>
-  </p:cSld>
-  <p:clrMapOvr>
-    <a:masterClrMapping/>
-  </p:clrMapOvr>
-</p:sld>
-</file>
-
 <file path=ppt/slides/slide25.xml><?xml version="1.0" encoding="utf-8"?>
 <p:sld xmlns:a="http://schemas.openxmlformats.org/drawingml/2006/main" xmlns:r="http://schemas.openxmlformats.org/officeDocument/2006/relationships" xmlns:p="http://schemas.openxmlformats.org/presentationml/2006/main">
   <p:cSld>
@@ -9986,8 +11378,12 @@
           <a:lstStyle/>
           <a:p>
             <a:r>
-              <a:rPr lang="zh-CN" altLang="en-US" dirty="0" smtClean="0"/>
-              <a:t>主要内容</a:t>
+              <a:rPr lang="en-US" altLang="zh-CN" dirty="0"/>
+              <a:t>The Load/Store </a:t>
+            </a:r>
+            <a:r>
+              <a:rPr lang="en-US" altLang="zh-CN" dirty="0" smtClean="0"/>
+              <a:t>Unit</a:t>
             </a:r>
             <a:endParaRPr lang="zh-CN" altLang="en-US" dirty="0"/>
           </a:p>
@@ -10009,6 +11405,194 @@
           <a:lstStyle/>
           <a:p>
             <a:r>
+              <a:rPr lang="zh-CN" altLang="en-US" sz="2400" dirty="0" smtClean="0">
+                <a:latin typeface="Calibri (正文)"/>
+              </a:rPr>
+              <a:t>三个队列</a:t>
+            </a:r>
+            <a:endParaRPr lang="en-US" altLang="zh-CN" sz="2400" dirty="0" smtClean="0">
+              <a:latin typeface="Calibri (正文)"/>
+            </a:endParaRPr>
+          </a:p>
+          <a:p>
+            <a:r>
+              <a:rPr lang="en-US" altLang="zh-CN" sz="2400" dirty="0" smtClean="0">
+                <a:latin typeface="Calibri (正文)"/>
+              </a:rPr>
+              <a:t>LAQ</a:t>
+            </a:r>
+            <a:r>
+              <a:rPr lang="zh-CN" altLang="en-US" sz="2400" dirty="0" smtClean="0">
+                <a:latin typeface="Calibri (正文)"/>
+              </a:rPr>
+              <a:t>位域</a:t>
+            </a:r>
+            <a:endParaRPr lang="en-US" altLang="zh-CN" sz="2400" dirty="0" smtClean="0">
+              <a:latin typeface="Calibri (正文)"/>
+            </a:endParaRPr>
+          </a:p>
+          <a:p>
+            <a:r>
+              <a:rPr lang="en-US" altLang="zh-CN" sz="2400" dirty="0" smtClean="0">
+                <a:latin typeface="Calibri (正文)"/>
+              </a:rPr>
+              <a:t>LSU </a:t>
+            </a:r>
+            <a:r>
+              <a:rPr lang="en-US" altLang="zh-CN" sz="2400" dirty="0" err="1" smtClean="0">
+                <a:latin typeface="Calibri (正文)"/>
+              </a:rPr>
+              <a:t>Behaviour</a:t>
+            </a:r>
+            <a:endParaRPr lang="en-US" altLang="zh-CN" sz="2400" dirty="0" smtClean="0">
+              <a:latin typeface="Calibri (正文)"/>
+            </a:endParaRPr>
+          </a:p>
+          <a:p>
+            <a:r>
+              <a:rPr lang="en-US" altLang="zh-CN" sz="2400" dirty="0" smtClean="0">
+                <a:latin typeface="Calibri (正文)"/>
+              </a:rPr>
+              <a:t>TLB miss</a:t>
+            </a:r>
+            <a:r>
+              <a:rPr lang="zh-CN" altLang="en-US" sz="2400" dirty="0" smtClean="0">
+                <a:latin typeface="Calibri (正文)"/>
+              </a:rPr>
+              <a:t>？</a:t>
+            </a:r>
+            <a:endParaRPr lang="en-US" altLang="zh-CN" sz="2400" dirty="0" smtClean="0">
+              <a:latin typeface="Calibri (正文)"/>
+            </a:endParaRPr>
+          </a:p>
+          <a:p>
+            <a:r>
+              <a:rPr lang="en-US" altLang="zh-CN" sz="2400" dirty="0" smtClean="0">
+                <a:latin typeface="Calibri (正文)"/>
+              </a:rPr>
+              <a:t>Bypass</a:t>
+            </a:r>
+            <a:r>
+              <a:rPr lang="zh-CN" altLang="en-US" sz="2400" dirty="0" smtClean="0">
+                <a:latin typeface="Calibri (正文)"/>
+              </a:rPr>
+              <a:t>？</a:t>
+            </a:r>
+            <a:endParaRPr lang="en-US" altLang="zh-CN" sz="2400" dirty="0" smtClean="0">
+              <a:latin typeface="Calibri (正文)"/>
+            </a:endParaRPr>
+          </a:p>
+          <a:p>
+            <a:r>
+              <a:rPr lang="en-US" altLang="zh-CN" sz="2400" dirty="0" smtClean="0">
+                <a:latin typeface="Calibri (正文)"/>
+              </a:rPr>
+              <a:t>Memory </a:t>
+            </a:r>
+            <a:r>
+              <a:rPr lang="en-US" altLang="zh-CN" sz="2400" dirty="0" err="1" smtClean="0">
+                <a:latin typeface="Calibri (正文)"/>
+              </a:rPr>
+              <a:t>Modle</a:t>
+            </a:r>
+            <a:endParaRPr lang="en-US" altLang="zh-CN" sz="2400" dirty="0" smtClean="0">
+              <a:latin typeface="Calibri (正文)"/>
+            </a:endParaRPr>
+          </a:p>
+          <a:p>
+            <a:r>
+              <a:rPr lang="en-US" altLang="zh-CN" sz="2400" dirty="0" smtClean="0">
+                <a:latin typeface="Calibri (正文)"/>
+              </a:rPr>
+              <a:t>Memory System &amp; </a:t>
+            </a:r>
+            <a:r>
+              <a:rPr lang="en-US" altLang="zh-CN" sz="2400" smtClean="0">
+                <a:latin typeface="Calibri (正文)"/>
+              </a:rPr>
+              <a:t>DCache</a:t>
+            </a:r>
+            <a:r>
+              <a:rPr lang="en-US" altLang="zh-CN" sz="2400" dirty="0" smtClean="0">
+                <a:latin typeface="Calibri (正文)"/>
+              </a:rPr>
+              <a:t> Shim</a:t>
+            </a:r>
+            <a:endParaRPr lang="zh-CN" altLang="en-US" sz="2400" dirty="0">
+              <a:latin typeface="Calibri (正文)"/>
+            </a:endParaRPr>
+          </a:p>
+        </p:txBody>
+      </p:sp>
+    </p:spTree>
+    <p:extLst>
+      <p:ext uri="{BB962C8B-B14F-4D97-AF65-F5344CB8AC3E}">
+        <p14:creationId xmlns:p14="http://schemas.microsoft.com/office/powerpoint/2010/main" val="2642976620"/>
+      </p:ext>
+    </p:extLst>
+  </p:cSld>
+  <p:clrMapOvr>
+    <a:masterClrMapping/>
+  </p:clrMapOvr>
+</p:sld>
+</file>
+
+<file path=ppt/slides/slide26.xml><?xml version="1.0" encoding="utf-8"?>
+<p:sld xmlns:a="http://schemas.openxmlformats.org/drawingml/2006/main" xmlns:r="http://schemas.openxmlformats.org/officeDocument/2006/relationships" xmlns:p="http://schemas.openxmlformats.org/presentationml/2006/main">
+  <p:cSld>
+    <p:spTree>
+      <p:nvGrpSpPr>
+        <p:cNvPr id="1" name=""/>
+        <p:cNvGrpSpPr/>
+        <p:nvPr/>
+      </p:nvGrpSpPr>
+      <p:grpSpPr>
+        <a:xfrm>
+          <a:off x="0" y="0"/>
+          <a:ext cx="0" cy="0"/>
+          <a:chOff x="0" y="0"/>
+          <a:chExt cx="0" cy="0"/>
+        </a:xfrm>
+      </p:grpSpPr>
+      <p:sp>
+        <p:nvSpPr>
+          <p:cNvPr id="2" name="标题 1"/>
+          <p:cNvSpPr>
+            <a:spLocks noGrp="1"/>
+          </p:cNvSpPr>
+          <p:nvPr>
+            <p:ph type="title"/>
+          </p:nvPr>
+        </p:nvSpPr>
+        <p:spPr/>
+        <p:txBody>
+          <a:bodyPr/>
+          <a:lstStyle/>
+          <a:p>
+            <a:r>
+              <a:rPr lang="zh-CN" altLang="en-US" dirty="0" smtClean="0"/>
+              <a:t>主要内容</a:t>
+            </a:r>
+            <a:endParaRPr lang="zh-CN" altLang="en-US" dirty="0"/>
+          </a:p>
+        </p:txBody>
+      </p:sp>
+      <p:sp>
+        <p:nvSpPr>
+          <p:cNvPr id="3" name="内容占位符 2"/>
+          <p:cNvSpPr>
+            <a:spLocks noGrp="1"/>
+          </p:cNvSpPr>
+          <p:nvPr>
+            <p:ph idx="1"/>
+          </p:nvPr>
+        </p:nvSpPr>
+        <p:spPr/>
+        <p:txBody>
+          <a:bodyPr/>
+          <a:lstStyle/>
+          <a:p>
+            <a:r>
               <a:rPr lang="en-US" altLang="zh-CN" sz="2400" dirty="0" smtClean="0"/>
               <a:t>Introduction &amp; Overview</a:t>
             </a:r>
@@ -10047,7 +11631,6 @@
               <a:rPr lang="en-US" altLang="zh-CN" sz="2400" dirty="0" smtClean="0"/>
               <a:t>ROB &amp; The Dispatch Stage </a:t>
             </a:r>
-            <a:endParaRPr lang="en-US" altLang="zh-CN" sz="2400" dirty="0" smtClean="0"/>
           </a:p>
           <a:p>
             <a:r>
@@ -10072,7 +11655,6 @@
               <a:rPr lang="en-US" altLang="zh-CN" sz="2400" dirty="0" smtClean="0"/>
               <a:t>The Load/Store Unit</a:t>
             </a:r>
-            <a:endParaRPr lang="en-US" altLang="zh-CN" sz="2400" dirty="0" smtClean="0"/>
           </a:p>
           <a:p>
             <a:r>
@@ -10119,7 +11701,7 @@
 </p:sld>
 </file>
 
-<file path=ppt/slides/slide26.xml><?xml version="1.0" encoding="utf-8"?>
+<file path=ppt/slides/slide27.xml><?xml version="1.0" encoding="utf-8"?>
 <p:sld xmlns:a="http://schemas.openxmlformats.org/drawingml/2006/main" xmlns:r="http://schemas.openxmlformats.org/officeDocument/2006/relationships" xmlns:p="http://schemas.openxmlformats.org/presentationml/2006/main">
   <p:cSld>
     <p:spTree>
@@ -11614,7 +13196,7 @@
 </p:sld>
 </file>
 
-<file path=ppt/slides/slide27.xml><?xml version="1.0" encoding="utf-8"?>
+<file path=ppt/slides/slide28.xml><?xml version="1.0" encoding="utf-8"?>
 <p:sld xmlns:a="http://schemas.openxmlformats.org/drawingml/2006/main" xmlns:r="http://schemas.openxmlformats.org/officeDocument/2006/relationships" xmlns:p="http://schemas.openxmlformats.org/presentationml/2006/main">
   <p:cSld>
     <p:spTree>
@@ -11768,7 +13350,7 @@
 </p:sld>
 </file>
 
-<file path=ppt/slides/slide28.xml><?xml version="1.0" encoding="utf-8"?>
+<file path=ppt/slides/slide29.xml><?xml version="1.0" encoding="utf-8"?>
 <p:sld xmlns:a="http://schemas.openxmlformats.org/drawingml/2006/main" xmlns:r="http://schemas.openxmlformats.org/officeDocument/2006/relationships" xmlns:p="http://schemas.openxmlformats.org/presentationml/2006/main">
   <p:cSld>
     <p:spTree>

</xml_diff>